<commit_message>
modification gant + sequence diapo
</commit_message>
<xml_diff>
--- a/Presentation revue 0 projet serre.pptx
+++ b/Presentation revue 0 projet serre.pptx
@@ -5,31 +5,34 @@
     <p:sldMasterId id="2147483850" r:id="rId1"/>
   </p:sldMasterIdLst>
   <p:notesMasterIdLst>
-    <p:notesMasterId r:id="rId24"/>
+    <p:notesMasterId r:id="rId27"/>
   </p:notesMasterIdLst>
   <p:sldIdLst>
     <p:sldId id="256" r:id="rId2"/>
     <p:sldId id="257" r:id="rId3"/>
     <p:sldId id="259" r:id="rId4"/>
     <p:sldId id="258" r:id="rId5"/>
-    <p:sldId id="272" r:id="rId6"/>
-    <p:sldId id="273" r:id="rId7"/>
-    <p:sldId id="274" r:id="rId8"/>
-    <p:sldId id="275" r:id="rId9"/>
-    <p:sldId id="263" r:id="rId10"/>
-    <p:sldId id="260" r:id="rId11"/>
-    <p:sldId id="261" r:id="rId12"/>
-    <p:sldId id="262" r:id="rId13"/>
-    <p:sldId id="267" r:id="rId14"/>
-    <p:sldId id="266" r:id="rId15"/>
-    <p:sldId id="276" r:id="rId16"/>
-    <p:sldId id="277" r:id="rId17"/>
-    <p:sldId id="278" r:id="rId18"/>
-    <p:sldId id="269" r:id="rId19"/>
-    <p:sldId id="270" r:id="rId20"/>
-    <p:sldId id="271" r:id="rId21"/>
-    <p:sldId id="279" r:id="rId22"/>
-    <p:sldId id="268" r:id="rId23"/>
+    <p:sldId id="280" r:id="rId6"/>
+    <p:sldId id="283" r:id="rId7"/>
+    <p:sldId id="281" r:id="rId8"/>
+    <p:sldId id="272" r:id="rId9"/>
+    <p:sldId id="273" r:id="rId10"/>
+    <p:sldId id="274" r:id="rId11"/>
+    <p:sldId id="275" r:id="rId12"/>
+    <p:sldId id="263" r:id="rId13"/>
+    <p:sldId id="260" r:id="rId14"/>
+    <p:sldId id="261" r:id="rId15"/>
+    <p:sldId id="262" r:id="rId16"/>
+    <p:sldId id="267" r:id="rId17"/>
+    <p:sldId id="266" r:id="rId18"/>
+    <p:sldId id="276" r:id="rId19"/>
+    <p:sldId id="277" r:id="rId20"/>
+    <p:sldId id="278" r:id="rId21"/>
+    <p:sldId id="269" r:id="rId22"/>
+    <p:sldId id="270" r:id="rId23"/>
+    <p:sldId id="271" r:id="rId24"/>
+    <p:sldId id="279" r:id="rId25"/>
+    <p:sldId id="268" r:id="rId26"/>
   </p:sldIdLst>
   <p:sldSz cx="12192000" cy="6858000"/>
   <p:notesSz cx="6858000" cy="9144000"/>
@@ -6510,7 +6513,7 @@
       </p:grpSpPr>
       <p:pic>
         <p:nvPicPr>
-          <p:cNvPr id="2" name="Image 1"/>
+          <p:cNvPr id="4" name="Image 3"/>
           <p:cNvPicPr>
             <a:picLocks noChangeAspect="1"/>
           </p:cNvPicPr>
@@ -6530,50 +6533,18 @@
         </p:blipFill>
         <p:spPr>
           <a:xfrm>
-            <a:off x="2375028" y="533843"/>
-            <a:ext cx="7259063" cy="6039693"/>
+            <a:off x="2546131" y="344820"/>
+            <a:ext cx="6272253" cy="6012321"/>
           </a:xfrm>
           <a:prstGeom prst="rect">
             <a:avLst/>
           </a:prstGeom>
         </p:spPr>
       </p:pic>
-      <p:sp>
-        <p:nvSpPr>
-          <p:cNvPr id="4" name="Rectangle 3"/>
-          <p:cNvSpPr/>
-          <p:nvPr/>
-        </p:nvSpPr>
-        <p:spPr>
-          <a:xfrm>
-            <a:off x="209950" y="164511"/>
-            <a:ext cx="1675330" cy="369332"/>
-          </a:xfrm>
-          <a:prstGeom prst="rect">
-            <a:avLst/>
-          </a:prstGeom>
-        </p:spPr>
-        <p:txBody>
-          <a:bodyPr wrap="none">
-            <a:spAutoFit/>
-          </a:bodyPr>
-          <a:lstStyle/>
-          <a:p>
-            <a:r>
-              <a:rPr lang="fr-FR" dirty="0">
-                <a:solidFill>
-                  <a:srgbClr val="FF0000"/>
-                </a:solidFill>
-              </a:rPr>
-              <a:t>IV. Logigramme</a:t>
-            </a:r>
-          </a:p>
-        </p:txBody>
-      </p:sp>
     </p:spTree>
     <p:extLst>
       <p:ext uri="{BB962C8B-B14F-4D97-AF65-F5344CB8AC3E}">
-        <p14:creationId xmlns:p14="http://schemas.microsoft.com/office/powerpoint/2010/main" val="3523522342"/>
+        <p14:creationId xmlns:p14="http://schemas.microsoft.com/office/powerpoint/2010/main" val="3602473879"/>
       </p:ext>
     </p:extLst>
   </p:cSld>
@@ -6591,6 +6562,181 @@
 </file>
 
 <file path=ppt/slides/slide11.xml><?xml version="1.0" encoding="utf-8"?>
+<p:sld xmlns:a="http://schemas.openxmlformats.org/drawingml/2006/main" xmlns:r="http://schemas.openxmlformats.org/officeDocument/2006/relationships" xmlns:p="http://schemas.openxmlformats.org/presentationml/2006/main">
+  <p:cSld>
+    <p:spTree>
+      <p:nvGrpSpPr>
+        <p:cNvPr id="1" name=""/>
+        <p:cNvGrpSpPr/>
+        <p:nvPr/>
+      </p:nvGrpSpPr>
+      <p:grpSpPr>
+        <a:xfrm>
+          <a:off x="0" y="0"/>
+          <a:ext cx="0" cy="0"/>
+          <a:chOff x="0" y="0"/>
+          <a:chExt cx="0" cy="0"/>
+        </a:xfrm>
+      </p:grpSpPr>
+      <p:pic>
+        <p:nvPicPr>
+          <p:cNvPr id="4" name="Image 3"/>
+          <p:cNvPicPr>
+            <a:picLocks noChangeAspect="1"/>
+          </p:cNvPicPr>
+          <p:nvPr/>
+        </p:nvPicPr>
+        <p:blipFill>
+          <a:blip r:embed="rId2">
+            <a:extLst>
+              <a:ext uri="{28A0092B-C50C-407E-A947-70E740481C1C}">
+                <a14:useLocalDpi xmlns:a14="http://schemas.microsoft.com/office/drawing/2010/main" val="0"/>
+              </a:ext>
+            </a:extLst>
+          </a:blip>
+          <a:stretch>
+            <a:fillRect/>
+          </a:stretch>
+        </p:blipFill>
+        <p:spPr>
+          <a:xfrm>
+            <a:off x="2293882" y="737901"/>
+            <a:ext cx="6808448" cy="5422443"/>
+          </a:xfrm>
+          <a:prstGeom prst="rect">
+            <a:avLst/>
+          </a:prstGeom>
+        </p:spPr>
+      </p:pic>
+    </p:spTree>
+    <p:extLst>
+      <p:ext uri="{BB962C8B-B14F-4D97-AF65-F5344CB8AC3E}">
+        <p14:creationId xmlns:p14="http://schemas.microsoft.com/office/powerpoint/2010/main" val="2943724827"/>
+      </p:ext>
+    </p:extLst>
+  </p:cSld>
+  <p:clrMapOvr>
+    <a:masterClrMapping/>
+  </p:clrMapOvr>
+  <p:timing>
+    <p:tnLst>
+      <p:par>
+        <p:cTn id="1" dur="indefinite" restart="never" nodeType="tmRoot"/>
+      </p:par>
+    </p:tnLst>
+  </p:timing>
+</p:sld>
+</file>
+
+<file path=ppt/slides/slide12.xml><?xml version="1.0" encoding="utf-8"?>
+<p:sld xmlns:a="http://schemas.openxmlformats.org/drawingml/2006/main" xmlns:r="http://schemas.openxmlformats.org/officeDocument/2006/relationships" xmlns:p="http://schemas.openxmlformats.org/presentationml/2006/main">
+  <p:cSld>
+    <p:spTree>
+      <p:nvGrpSpPr>
+        <p:cNvPr id="1" name=""/>
+        <p:cNvGrpSpPr/>
+        <p:nvPr/>
+      </p:nvGrpSpPr>
+      <p:grpSpPr>
+        <a:xfrm>
+          <a:off x="0" y="0"/>
+          <a:ext cx="0" cy="0"/>
+          <a:chOff x="0" y="0"/>
+          <a:chExt cx="0" cy="0"/>
+        </a:xfrm>
+      </p:grpSpPr>
+      <p:sp>
+        <p:nvSpPr>
+          <p:cNvPr id="3" name="ZoneTexte 2">
+            <a:extLst>
+              <a:ext uri="{FF2B5EF4-FFF2-40B4-BE49-F238E27FC236}">
+                <a16:creationId xmlns:a16="http://schemas.microsoft.com/office/drawing/2014/main" id="{8185D6C2-D95C-4E45-A146-B74583E5BE84}"/>
+              </a:ext>
+            </a:extLst>
+          </p:cNvPr>
+          <p:cNvSpPr txBox="1"/>
+          <p:nvPr/>
+        </p:nvSpPr>
+        <p:spPr>
+          <a:xfrm>
+            <a:off x="5378741" y="83711"/>
+            <a:ext cx="1434517" cy="369332"/>
+          </a:xfrm>
+          <a:prstGeom prst="rect">
+            <a:avLst/>
+          </a:prstGeom>
+          <a:noFill/>
+        </p:spPr>
+        <p:txBody>
+          <a:bodyPr wrap="square" rtlCol="0">
+            <a:spAutoFit/>
+          </a:bodyPr>
+          <a:lstStyle/>
+          <a:p>
+            <a:r>
+              <a:rPr lang="fr-FR" dirty="0"/>
+              <a:t>Etudiant 3</a:t>
+            </a:r>
+          </a:p>
+        </p:txBody>
+      </p:sp>
+      <p:pic>
+        <p:nvPicPr>
+          <p:cNvPr id="5" name="Image 4">
+            <a:extLst>
+              <a:ext uri="{FF2B5EF4-FFF2-40B4-BE49-F238E27FC236}">
+                <a16:creationId xmlns:a16="http://schemas.microsoft.com/office/drawing/2014/main" id="{911A8E25-D6B9-4FE1-8F10-03F1E9AF6824}"/>
+              </a:ext>
+            </a:extLst>
+          </p:cNvPr>
+          <p:cNvPicPr>
+            <a:picLocks noChangeAspect="1"/>
+          </p:cNvPicPr>
+          <p:nvPr/>
+        </p:nvPicPr>
+        <p:blipFill>
+          <a:blip r:embed="rId2">
+            <a:extLst>
+              <a:ext uri="{28A0092B-C50C-407E-A947-70E740481C1C}">
+                <a14:useLocalDpi xmlns:a14="http://schemas.microsoft.com/office/drawing/2010/main" val="0"/>
+              </a:ext>
+            </a:extLst>
+          </a:blip>
+          <a:stretch>
+            <a:fillRect/>
+          </a:stretch>
+        </p:blipFill>
+        <p:spPr>
+          <a:xfrm>
+            <a:off x="153314" y="637708"/>
+            <a:ext cx="11759053" cy="5755071"/>
+          </a:xfrm>
+          <a:prstGeom prst="rect">
+            <a:avLst/>
+          </a:prstGeom>
+        </p:spPr>
+      </p:pic>
+    </p:spTree>
+    <p:extLst>
+      <p:ext uri="{BB962C8B-B14F-4D97-AF65-F5344CB8AC3E}">
+        <p14:creationId xmlns:p14="http://schemas.microsoft.com/office/powerpoint/2010/main" val="3295572073"/>
+      </p:ext>
+    </p:extLst>
+  </p:cSld>
+  <p:clrMapOvr>
+    <a:masterClrMapping/>
+  </p:clrMapOvr>
+  <p:timing>
+    <p:tnLst>
+      <p:par>
+        <p:cTn id="1" dur="indefinite" restart="never" nodeType="tmRoot"/>
+      </p:par>
+    </p:tnLst>
+  </p:timing>
+</p:sld>
+</file>
+
+<file path=ppt/slides/slide13.xml><?xml version="1.0" encoding="utf-8"?>
 <p:sld xmlns:a="http://schemas.openxmlformats.org/drawingml/2006/main" xmlns:r="http://schemas.openxmlformats.org/officeDocument/2006/relationships" xmlns:p="http://schemas.openxmlformats.org/presentationml/2006/main">
   <p:cSld>
     <p:spTree>
@@ -6629,8 +6775,8 @@
         </p:blipFill>
         <p:spPr>
           <a:xfrm>
-            <a:off x="2959331" y="2113651"/>
-            <a:ext cx="5445253" cy="2692871"/>
+            <a:off x="2375028" y="533843"/>
+            <a:ext cx="7259063" cy="6039693"/>
           </a:xfrm>
           <a:prstGeom prst="rect">
             <a:avLst/>
@@ -6639,14 +6785,14 @@
       </p:pic>
       <p:sp>
         <p:nvSpPr>
-          <p:cNvPr id="3" name="Rectangle 2"/>
+          <p:cNvPr id="4" name="Rectangle 3"/>
           <p:cNvSpPr/>
           <p:nvPr/>
         </p:nvSpPr>
         <p:spPr>
           <a:xfrm>
-            <a:off x="202730" y="376443"/>
-            <a:ext cx="880241" cy="369332"/>
+            <a:off x="209950" y="164511"/>
+            <a:ext cx="1675330" cy="369332"/>
           </a:xfrm>
           <a:prstGeom prst="rect">
             <a:avLst/>
@@ -6664,7 +6810,7 @@
                   <a:srgbClr val="FF0000"/>
                 </a:solidFill>
               </a:rPr>
-              <a:t>V. MCD</a:t>
+              <a:t>IV. Logigramme</a:t>
             </a:r>
           </a:p>
         </p:txBody>
@@ -6672,7 +6818,7 @@
     </p:spTree>
     <p:extLst>
       <p:ext uri="{BB962C8B-B14F-4D97-AF65-F5344CB8AC3E}">
-        <p14:creationId xmlns:p14="http://schemas.microsoft.com/office/powerpoint/2010/main" val="2715056959"/>
+        <p14:creationId xmlns:p14="http://schemas.microsoft.com/office/powerpoint/2010/main" val="3523522342"/>
       </p:ext>
     </p:extLst>
   </p:cSld>
@@ -6689,7 +6835,7 @@
 </p:sld>
 </file>
 
-<file path=ppt/slides/slide12.xml><?xml version="1.0" encoding="utf-8"?>
+<file path=ppt/slides/slide14.xml><?xml version="1.0" encoding="utf-8"?>
 <p:sld xmlns:a="http://schemas.openxmlformats.org/drawingml/2006/main" xmlns:r="http://schemas.openxmlformats.org/officeDocument/2006/relationships" xmlns:p="http://schemas.openxmlformats.org/presentationml/2006/main">
   <p:cSld>
     <p:spTree>
@@ -6728,8 +6874,8 @@
         </p:blipFill>
         <p:spPr>
           <a:xfrm>
-            <a:off x="230750" y="714895"/>
-            <a:ext cx="11599188" cy="5748451"/>
+            <a:off x="2959331" y="2113651"/>
+            <a:ext cx="5445253" cy="2692871"/>
           </a:xfrm>
           <a:prstGeom prst="rect">
             <a:avLst/>
@@ -6744,8 +6890,8 @@
         </p:nvSpPr>
         <p:spPr>
           <a:xfrm>
-            <a:off x="230750" y="345563"/>
-            <a:ext cx="2589170" cy="369332"/>
+            <a:off x="202730" y="376443"/>
+            <a:ext cx="880241" cy="369332"/>
           </a:xfrm>
           <a:prstGeom prst="rect">
             <a:avLst/>
@@ -6763,42 +6909,7 @@
                   <a:srgbClr val="FF0000"/>
                 </a:solidFill>
               </a:rPr>
-              <a:t>VI. Diagramme de classe</a:t>
-            </a:r>
-          </a:p>
-        </p:txBody>
-      </p:sp>
-      <p:sp>
-        <p:nvSpPr>
-          <p:cNvPr id="5" name="ZoneTexte 4">
-            <a:extLst>
-              <a:ext uri="{FF2B5EF4-FFF2-40B4-BE49-F238E27FC236}">
-                <a16:creationId xmlns:a16="http://schemas.microsoft.com/office/drawing/2014/main" id="{2AF41A51-1252-43EE-A92B-E094AFF9BF0F}"/>
-              </a:ext>
-            </a:extLst>
-          </p:cNvPr>
-          <p:cNvSpPr txBox="1"/>
-          <p:nvPr/>
-        </p:nvSpPr>
-        <p:spPr>
-          <a:xfrm>
-            <a:off x="5553512" y="209988"/>
-            <a:ext cx="2080470" cy="369332"/>
-          </a:xfrm>
-          <a:prstGeom prst="rect">
-            <a:avLst/>
-          </a:prstGeom>
-          <a:noFill/>
-        </p:spPr>
-        <p:txBody>
-          <a:bodyPr wrap="square" rtlCol="0">
-            <a:spAutoFit/>
-          </a:bodyPr>
-          <a:lstStyle/>
-          <a:p>
-            <a:r>
-              <a:rPr lang="fr-FR" dirty="0"/>
-              <a:t>Etudiant  1</a:t>
+              <a:t>V. MCD</a:t>
             </a:r>
           </a:p>
         </p:txBody>
@@ -6806,608 +6917,7 @@
     </p:spTree>
     <p:extLst>
       <p:ext uri="{BB962C8B-B14F-4D97-AF65-F5344CB8AC3E}">
-        <p14:creationId xmlns:p14="http://schemas.microsoft.com/office/powerpoint/2010/main" val="1276361415"/>
-      </p:ext>
-    </p:extLst>
-  </p:cSld>
-  <p:clrMapOvr>
-    <a:masterClrMapping/>
-  </p:clrMapOvr>
-  <p:timing>
-    <p:tnLst>
-      <p:par>
-        <p:cTn id="1" dur="indefinite" restart="never" nodeType="tmRoot"/>
-      </p:par>
-    </p:tnLst>
-  </p:timing>
-</p:sld>
-</file>
-
-<file path=ppt/slides/slide13.xml><?xml version="1.0" encoding="utf-8"?>
-<p:sld xmlns:a="http://schemas.openxmlformats.org/drawingml/2006/main" xmlns:r="http://schemas.openxmlformats.org/officeDocument/2006/relationships" xmlns:p="http://schemas.openxmlformats.org/presentationml/2006/main">
-  <p:cSld>
-    <p:spTree>
-      <p:nvGrpSpPr>
-        <p:cNvPr id="1" name=""/>
-        <p:cNvGrpSpPr/>
-        <p:nvPr/>
-      </p:nvGrpSpPr>
-      <p:grpSpPr>
-        <a:xfrm>
-          <a:off x="0" y="0"/>
-          <a:ext cx="0" cy="0"/>
-          <a:chOff x="0" y="0"/>
-          <a:chExt cx="0" cy="0"/>
-        </a:xfrm>
-      </p:grpSpPr>
-      <p:sp>
-        <p:nvSpPr>
-          <p:cNvPr id="6" name="ZoneTexte 5">
-            <a:extLst>
-              <a:ext uri="{FF2B5EF4-FFF2-40B4-BE49-F238E27FC236}">
-                <a16:creationId xmlns:a16="http://schemas.microsoft.com/office/drawing/2014/main" id="{D3CF817F-0ABA-4F0A-9608-9CC5197078E8}"/>
-              </a:ext>
-            </a:extLst>
-          </p:cNvPr>
-          <p:cNvSpPr txBox="1"/>
-          <p:nvPr/>
-        </p:nvSpPr>
-        <p:spPr>
-          <a:xfrm>
-            <a:off x="5532539" y="167672"/>
-            <a:ext cx="2457975" cy="369332"/>
-          </a:xfrm>
-          <a:prstGeom prst="rect">
-            <a:avLst/>
-          </a:prstGeom>
-          <a:noFill/>
-        </p:spPr>
-        <p:txBody>
-          <a:bodyPr wrap="square" rtlCol="0">
-            <a:spAutoFit/>
-          </a:bodyPr>
-          <a:lstStyle/>
-          <a:p>
-            <a:r>
-              <a:rPr lang="fr-FR" dirty="0"/>
-              <a:t>Etudiant 3</a:t>
-            </a:r>
-          </a:p>
-        </p:txBody>
-      </p:sp>
-      <p:pic>
-        <p:nvPicPr>
-          <p:cNvPr id="8" name="Image 7">
-            <a:extLst>
-              <a:ext uri="{FF2B5EF4-FFF2-40B4-BE49-F238E27FC236}">
-                <a16:creationId xmlns:a16="http://schemas.microsoft.com/office/drawing/2014/main" id="{4732AAF5-7BC1-440A-9AFD-70B409DE87BF}"/>
-              </a:ext>
-            </a:extLst>
-          </p:cNvPr>
-          <p:cNvPicPr>
-            <a:picLocks noChangeAspect="1"/>
-          </p:cNvPicPr>
-          <p:nvPr/>
-        </p:nvPicPr>
-        <p:blipFill>
-          <a:blip r:embed="rId2">
-            <a:extLst>
-              <a:ext uri="{28A0092B-C50C-407E-A947-70E740481C1C}">
-                <a14:useLocalDpi xmlns:a14="http://schemas.microsoft.com/office/drawing/2010/main" val="0"/>
-              </a:ext>
-            </a:extLst>
-          </a:blip>
-          <a:stretch>
-            <a:fillRect/>
-          </a:stretch>
-        </p:blipFill>
-        <p:spPr>
-          <a:xfrm>
-            <a:off x="426462" y="1333850"/>
-            <a:ext cx="11577439" cy="4278385"/>
-          </a:xfrm>
-          <a:prstGeom prst="rect">
-            <a:avLst/>
-          </a:prstGeom>
-        </p:spPr>
-      </p:pic>
-    </p:spTree>
-    <p:extLst>
-      <p:ext uri="{BB962C8B-B14F-4D97-AF65-F5344CB8AC3E}">
-        <p14:creationId xmlns:p14="http://schemas.microsoft.com/office/powerpoint/2010/main" val="2051653351"/>
-      </p:ext>
-    </p:extLst>
-  </p:cSld>
-  <p:clrMapOvr>
-    <a:masterClrMapping/>
-  </p:clrMapOvr>
-  <p:timing>
-    <p:tnLst>
-      <p:par>
-        <p:cTn id="1" dur="indefinite" restart="never" nodeType="tmRoot"/>
-      </p:par>
-    </p:tnLst>
-  </p:timing>
-</p:sld>
-</file>
-
-<file path=ppt/slides/slide14.xml><?xml version="1.0" encoding="utf-8"?>
-<p:sld xmlns:a="http://schemas.openxmlformats.org/drawingml/2006/main" xmlns:r="http://schemas.openxmlformats.org/officeDocument/2006/relationships" xmlns:p="http://schemas.openxmlformats.org/presentationml/2006/main">
-  <p:cSld>
-    <p:spTree>
-      <p:nvGrpSpPr>
-        <p:cNvPr id="1" name=""/>
-        <p:cNvGrpSpPr/>
-        <p:nvPr/>
-      </p:nvGrpSpPr>
-      <p:grpSpPr>
-        <a:xfrm>
-          <a:off x="0" y="0"/>
-          <a:ext cx="0" cy="0"/>
-          <a:chOff x="0" y="0"/>
-          <a:chExt cx="0" cy="0"/>
-        </a:xfrm>
-      </p:grpSpPr>
-      <p:sp>
-        <p:nvSpPr>
-          <p:cNvPr id="2" name="Rectangle 1"/>
-          <p:cNvSpPr/>
-          <p:nvPr/>
-        </p:nvSpPr>
-        <p:spPr>
-          <a:xfrm>
-            <a:off x="262069" y="285003"/>
-            <a:ext cx="1393330" cy="369332"/>
-          </a:xfrm>
-          <a:prstGeom prst="rect">
-            <a:avLst/>
-          </a:prstGeom>
-        </p:spPr>
-        <p:txBody>
-          <a:bodyPr wrap="none">
-            <a:spAutoFit/>
-          </a:bodyPr>
-          <a:lstStyle/>
-          <a:p>
-            <a:r>
-              <a:rPr lang="fr-FR" dirty="0">
-                <a:solidFill>
-                  <a:srgbClr val="FF0000"/>
-                </a:solidFill>
-              </a:rPr>
-              <a:t>VII. Scénario</a:t>
-            </a:r>
-          </a:p>
-        </p:txBody>
-      </p:sp>
-      <p:sp>
-        <p:nvSpPr>
-          <p:cNvPr id="3" name="Rectangle 2"/>
-          <p:cNvSpPr/>
-          <p:nvPr/>
-        </p:nvSpPr>
-        <p:spPr>
-          <a:xfrm>
-            <a:off x="1147156" y="1191743"/>
-            <a:ext cx="10083338" cy="4421788"/>
-          </a:xfrm>
-          <a:prstGeom prst="rect">
-            <a:avLst/>
-          </a:prstGeom>
-        </p:spPr>
-        <p:txBody>
-          <a:bodyPr wrap="square">
-            <a:spAutoFit/>
-          </a:bodyPr>
-          <a:lstStyle/>
-          <a:p>
-            <a:pPr marL="342900" lvl="0" indent="-342900">
-              <a:lnSpc>
-                <a:spcPct val="107000"/>
-              </a:lnSpc>
-              <a:spcAft>
-                <a:spcPts val="0"/>
-              </a:spcAft>
-              <a:buFont typeface="+mj-lt"/>
-              <a:buAutoNum type="arabicPeriod"/>
-            </a:pPr>
-            <a:r>
-              <a:rPr lang="fr-FR" sz="1600" dirty="0">
-                <a:effectLst/>
-                <a:latin typeface="Calibri" panose="020F0502020204030204" pitchFamily="34" charset="0"/>
-                <a:ea typeface="Calibri" panose="020F0502020204030204" pitchFamily="34" charset="0"/>
-                <a:cs typeface="Times New Roman" panose="02020603050405020304" pitchFamily="18" charset="0"/>
-              </a:rPr>
-              <a:t>Le capteur mesure le niveau d’eau des cuves</a:t>
-            </a:r>
-            <a:endParaRPr lang="fr-FR" sz="1400" dirty="0">
-              <a:effectLst/>
-              <a:latin typeface="Calibri" panose="020F0502020204030204" pitchFamily="34" charset="0"/>
-              <a:ea typeface="Calibri" panose="020F0502020204030204" pitchFamily="34" charset="0"/>
-              <a:cs typeface="Times New Roman" panose="02020603050405020304" pitchFamily="18" charset="0"/>
-            </a:endParaRPr>
-          </a:p>
-          <a:p>
-            <a:pPr marL="742950" lvl="1" indent="-285750">
-              <a:lnSpc>
-                <a:spcPct val="107000"/>
-              </a:lnSpc>
-              <a:spcAft>
-                <a:spcPts val="0"/>
-              </a:spcAft>
-              <a:buFont typeface="+mj-lt"/>
-              <a:buAutoNum type="arabicPeriod"/>
-            </a:pPr>
-            <a:r>
-              <a:rPr lang="fr-FR" sz="1600" dirty="0">
-                <a:effectLst/>
-                <a:latin typeface="Calibri" panose="020F0502020204030204" pitchFamily="34" charset="0"/>
-                <a:ea typeface="Calibri" panose="020F0502020204030204" pitchFamily="34" charset="0"/>
-                <a:cs typeface="Times New Roman" panose="02020603050405020304" pitchFamily="18" charset="0"/>
-              </a:rPr>
-              <a:t>Si la cuve du toit n’est pas remplie et que celle de récupération l’est, activer la pompe de relevage</a:t>
-            </a:r>
-            <a:endParaRPr lang="fr-FR" sz="1400" dirty="0">
-              <a:effectLst/>
-              <a:latin typeface="Calibri" panose="020F0502020204030204" pitchFamily="34" charset="0"/>
-              <a:ea typeface="Calibri" panose="020F0502020204030204" pitchFamily="34" charset="0"/>
-              <a:cs typeface="Times New Roman" panose="02020603050405020304" pitchFamily="18" charset="0"/>
-            </a:endParaRPr>
-          </a:p>
-          <a:p>
-            <a:pPr marL="742950" lvl="1" indent="-285750">
-              <a:lnSpc>
-                <a:spcPct val="107000"/>
-              </a:lnSpc>
-              <a:spcAft>
-                <a:spcPts val="0"/>
-              </a:spcAft>
-              <a:buFont typeface="+mj-lt"/>
-              <a:buAutoNum type="arabicPeriod"/>
-            </a:pPr>
-            <a:r>
-              <a:rPr lang="fr-FR" sz="1600" dirty="0">
-                <a:effectLst/>
-                <a:latin typeface="Calibri" panose="020F0502020204030204" pitchFamily="34" charset="0"/>
-                <a:ea typeface="Calibri" panose="020F0502020204030204" pitchFamily="34" charset="0"/>
-                <a:cs typeface="Times New Roman" panose="02020603050405020304" pitchFamily="18" charset="0"/>
-              </a:rPr>
-              <a:t>Si la cuve du toit est pleine, le système utilise l’eau de pluie</a:t>
-            </a:r>
-            <a:endParaRPr lang="fr-FR" sz="1400" dirty="0">
-              <a:effectLst/>
-              <a:latin typeface="Calibri" panose="020F0502020204030204" pitchFamily="34" charset="0"/>
-              <a:ea typeface="Calibri" panose="020F0502020204030204" pitchFamily="34" charset="0"/>
-              <a:cs typeface="Times New Roman" panose="02020603050405020304" pitchFamily="18" charset="0"/>
-            </a:endParaRPr>
-          </a:p>
-          <a:p>
-            <a:pPr marL="742950" lvl="1" indent="-285750">
-              <a:lnSpc>
-                <a:spcPct val="107000"/>
-              </a:lnSpc>
-              <a:spcAft>
-                <a:spcPts val="0"/>
-              </a:spcAft>
-              <a:buFont typeface="+mj-lt"/>
-              <a:buAutoNum type="arabicPeriod"/>
-            </a:pPr>
-            <a:r>
-              <a:rPr lang="fr-FR" sz="1600" dirty="0">
-                <a:effectLst/>
-                <a:latin typeface="Calibri" panose="020F0502020204030204" pitchFamily="34" charset="0"/>
-                <a:ea typeface="Calibri" panose="020F0502020204030204" pitchFamily="34" charset="0"/>
-                <a:cs typeface="Times New Roman" panose="02020603050405020304" pitchFamily="18" charset="0"/>
-              </a:rPr>
-              <a:t>Si la cuve du toit et de récupération sont vides ou à un niveau critique (&lt;10 cm), utiliser l’eau courante.</a:t>
-            </a:r>
-            <a:endParaRPr lang="fr-FR" sz="1400" dirty="0">
-              <a:effectLst/>
-              <a:latin typeface="Calibri" panose="020F0502020204030204" pitchFamily="34" charset="0"/>
-              <a:ea typeface="Calibri" panose="020F0502020204030204" pitchFamily="34" charset="0"/>
-              <a:cs typeface="Times New Roman" panose="02020603050405020304" pitchFamily="18" charset="0"/>
-            </a:endParaRPr>
-          </a:p>
-          <a:p>
-            <a:pPr marL="342900" lvl="0" indent="-342900">
-              <a:lnSpc>
-                <a:spcPct val="107000"/>
-              </a:lnSpc>
-              <a:spcAft>
-                <a:spcPts val="0"/>
-              </a:spcAft>
-              <a:buFont typeface="+mj-lt"/>
-              <a:buAutoNum type="arabicPeriod"/>
-            </a:pPr>
-            <a:r>
-              <a:rPr lang="fr-FR" sz="1600" dirty="0">
-                <a:effectLst/>
-                <a:latin typeface="Calibri" panose="020F0502020204030204" pitchFamily="34" charset="0"/>
-                <a:ea typeface="Calibri" panose="020F0502020204030204" pitchFamily="34" charset="0"/>
-                <a:cs typeface="Times New Roman" panose="02020603050405020304" pitchFamily="18" charset="0"/>
-              </a:rPr>
-              <a:t>Le capteur mesure la température de l’air</a:t>
-            </a:r>
-            <a:endParaRPr lang="fr-FR" sz="1400" dirty="0">
-              <a:effectLst/>
-              <a:latin typeface="Calibri" panose="020F0502020204030204" pitchFamily="34" charset="0"/>
-              <a:ea typeface="Calibri" panose="020F0502020204030204" pitchFamily="34" charset="0"/>
-              <a:cs typeface="Times New Roman" panose="02020603050405020304" pitchFamily="18" charset="0"/>
-            </a:endParaRPr>
-          </a:p>
-          <a:p>
-            <a:pPr marL="228600">
-              <a:lnSpc>
-                <a:spcPct val="107000"/>
-              </a:lnSpc>
-              <a:spcAft>
-                <a:spcPts val="0"/>
-              </a:spcAft>
-            </a:pPr>
-            <a:r>
-              <a:rPr lang="fr-FR" sz="1600" dirty="0">
-                <a:effectLst/>
-                <a:latin typeface="Calibri" panose="020F0502020204030204" pitchFamily="34" charset="0"/>
-                <a:ea typeface="Calibri" panose="020F0502020204030204" pitchFamily="34" charset="0"/>
-                <a:cs typeface="Times New Roman" panose="02020603050405020304" pitchFamily="18" charset="0"/>
-              </a:rPr>
-              <a:t>2.1 Si la température est égale ou inférieure à zéro, le système utilise l’eau courante</a:t>
-            </a:r>
-            <a:endParaRPr lang="fr-FR" sz="1400" dirty="0">
-              <a:effectLst/>
-              <a:latin typeface="Calibri" panose="020F0502020204030204" pitchFamily="34" charset="0"/>
-              <a:ea typeface="Calibri" panose="020F0502020204030204" pitchFamily="34" charset="0"/>
-              <a:cs typeface="Times New Roman" panose="02020603050405020304" pitchFamily="18" charset="0"/>
-            </a:endParaRPr>
-          </a:p>
-          <a:p>
-            <a:pPr marL="228600">
-              <a:lnSpc>
-                <a:spcPct val="107000"/>
-              </a:lnSpc>
-              <a:spcAft>
-                <a:spcPts val="0"/>
-              </a:spcAft>
-            </a:pPr>
-            <a:r>
-              <a:rPr lang="fr-FR" sz="1600" dirty="0">
-                <a:effectLst/>
-                <a:latin typeface="Calibri" panose="020F0502020204030204" pitchFamily="34" charset="0"/>
-                <a:ea typeface="Calibri" panose="020F0502020204030204" pitchFamily="34" charset="0"/>
-                <a:cs typeface="Times New Roman" panose="02020603050405020304" pitchFamily="18" charset="0"/>
-              </a:rPr>
-              <a:t> </a:t>
-            </a:r>
-            <a:endParaRPr lang="fr-FR" sz="1400" dirty="0">
-              <a:effectLst/>
-              <a:latin typeface="Calibri" panose="020F0502020204030204" pitchFamily="34" charset="0"/>
-              <a:ea typeface="Calibri" panose="020F0502020204030204" pitchFamily="34" charset="0"/>
-              <a:cs typeface="Times New Roman" panose="02020603050405020304" pitchFamily="18" charset="0"/>
-            </a:endParaRPr>
-          </a:p>
-          <a:p>
-            <a:pPr marL="342900" lvl="0" indent="-342900">
-              <a:lnSpc>
-                <a:spcPct val="107000"/>
-              </a:lnSpc>
-              <a:spcAft>
-                <a:spcPts val="0"/>
-              </a:spcAft>
-              <a:buFont typeface="+mj-lt"/>
-              <a:buAutoNum type="arabicPeriod"/>
-            </a:pPr>
-            <a:r>
-              <a:rPr lang="fr-FR" sz="1600" dirty="0">
-                <a:effectLst/>
-                <a:latin typeface="Calibri" panose="020F0502020204030204" pitchFamily="34" charset="0"/>
-                <a:ea typeface="Calibri" panose="020F0502020204030204" pitchFamily="34" charset="0"/>
-                <a:cs typeface="Times New Roman" panose="02020603050405020304" pitchFamily="18" charset="0"/>
-              </a:rPr>
-              <a:t>La serre est alimentée en eau</a:t>
-            </a:r>
-            <a:endParaRPr lang="fr-FR" sz="1400" dirty="0">
-              <a:effectLst/>
-              <a:latin typeface="Calibri" panose="020F0502020204030204" pitchFamily="34" charset="0"/>
-              <a:ea typeface="Calibri" panose="020F0502020204030204" pitchFamily="34" charset="0"/>
-              <a:cs typeface="Times New Roman" panose="02020603050405020304" pitchFamily="18" charset="0"/>
-            </a:endParaRPr>
-          </a:p>
-          <a:p>
-            <a:pPr marL="342900" lvl="0" indent="-342900">
-              <a:lnSpc>
-                <a:spcPct val="107000"/>
-              </a:lnSpc>
-              <a:spcAft>
-                <a:spcPts val="0"/>
-              </a:spcAft>
-              <a:buFont typeface="+mj-lt"/>
-              <a:buAutoNum type="arabicPeriod"/>
-            </a:pPr>
-            <a:r>
-              <a:rPr lang="fr-FR" sz="1600" dirty="0">
-                <a:effectLst/>
-                <a:latin typeface="Calibri" panose="020F0502020204030204" pitchFamily="34" charset="0"/>
-                <a:ea typeface="Calibri" panose="020F0502020204030204" pitchFamily="34" charset="0"/>
-                <a:cs typeface="Times New Roman" panose="02020603050405020304" pitchFamily="18" charset="0"/>
-              </a:rPr>
-              <a:t>Le système mesure la consommation en eau de la serre sur les deux réseaux (eau de pluie et eau courante)</a:t>
-            </a:r>
-            <a:endParaRPr lang="fr-FR" sz="1400" dirty="0">
-              <a:effectLst/>
-              <a:latin typeface="Calibri" panose="020F0502020204030204" pitchFamily="34" charset="0"/>
-              <a:ea typeface="Calibri" panose="020F0502020204030204" pitchFamily="34" charset="0"/>
-              <a:cs typeface="Times New Roman" panose="02020603050405020304" pitchFamily="18" charset="0"/>
-            </a:endParaRPr>
-          </a:p>
-          <a:p>
-            <a:pPr marL="228600">
-              <a:lnSpc>
-                <a:spcPct val="107000"/>
-              </a:lnSpc>
-              <a:spcAft>
-                <a:spcPts val="0"/>
-              </a:spcAft>
-            </a:pPr>
-            <a:r>
-              <a:rPr lang="fr-FR" sz="1600" dirty="0">
-                <a:effectLst/>
-                <a:latin typeface="Calibri" panose="020F0502020204030204" pitchFamily="34" charset="0"/>
-                <a:ea typeface="Calibri" panose="020F0502020204030204" pitchFamily="34" charset="0"/>
-                <a:cs typeface="Times New Roman" panose="02020603050405020304" pitchFamily="18" charset="0"/>
-              </a:rPr>
-              <a:t>4.1 Enregistrer la consommation d’eau heure par heure dans la BDD</a:t>
-            </a:r>
-            <a:endParaRPr lang="fr-FR" sz="1400" dirty="0">
-              <a:effectLst/>
-              <a:latin typeface="Calibri" panose="020F0502020204030204" pitchFamily="34" charset="0"/>
-              <a:ea typeface="Calibri" panose="020F0502020204030204" pitchFamily="34" charset="0"/>
-              <a:cs typeface="Times New Roman" panose="02020603050405020304" pitchFamily="18" charset="0"/>
-            </a:endParaRPr>
-          </a:p>
-          <a:p>
-            <a:pPr marL="228600">
-              <a:lnSpc>
-                <a:spcPct val="107000"/>
-              </a:lnSpc>
-              <a:spcAft>
-                <a:spcPts val="800"/>
-              </a:spcAft>
-            </a:pPr>
-            <a:r>
-              <a:rPr lang="fr-FR" sz="1600" dirty="0">
-                <a:effectLst/>
-                <a:latin typeface="Calibri" panose="020F0502020204030204" pitchFamily="34" charset="0"/>
-                <a:ea typeface="Calibri" panose="020F0502020204030204" pitchFamily="34" charset="0"/>
-                <a:cs typeface="Times New Roman" panose="02020603050405020304" pitchFamily="18" charset="0"/>
-              </a:rPr>
-              <a:t>4.2 Afficher sous forme graphique les données de consommation d’eau par période</a:t>
-            </a:r>
-            <a:endParaRPr lang="fr-FR" sz="1400" dirty="0">
-              <a:effectLst/>
-              <a:latin typeface="Calibri" panose="020F0502020204030204" pitchFamily="34" charset="0"/>
-              <a:ea typeface="Calibri" panose="020F0502020204030204" pitchFamily="34" charset="0"/>
-              <a:cs typeface="Times New Roman" panose="02020603050405020304" pitchFamily="18" charset="0"/>
-            </a:endParaRPr>
-          </a:p>
-          <a:p>
-            <a:pPr marL="342900" indent="-342900">
-              <a:lnSpc>
-                <a:spcPct val="107000"/>
-              </a:lnSpc>
-              <a:spcAft>
-                <a:spcPts val="800"/>
-              </a:spcAft>
-              <a:buAutoNum type="arabicPeriod" startAt="5"/>
-            </a:pPr>
-            <a:r>
-              <a:rPr lang="fr-FR" sz="1600" dirty="0" smtClean="0">
-                <a:effectLst/>
-                <a:latin typeface="Calibri" panose="020F0502020204030204" pitchFamily="34" charset="0"/>
-                <a:ea typeface="Calibri" panose="020F0502020204030204" pitchFamily="34" charset="0"/>
-                <a:cs typeface="Times New Roman" panose="02020603050405020304" pitchFamily="18" charset="0"/>
-              </a:rPr>
-              <a:t>Administrer </a:t>
-            </a:r>
-            <a:r>
-              <a:rPr lang="fr-FR" sz="1600" dirty="0">
-                <a:effectLst/>
-                <a:latin typeface="Calibri" panose="020F0502020204030204" pitchFamily="34" charset="0"/>
-                <a:ea typeface="Calibri" panose="020F0502020204030204" pitchFamily="34" charset="0"/>
-                <a:cs typeface="Times New Roman" panose="02020603050405020304" pitchFamily="18" charset="0"/>
-              </a:rPr>
-              <a:t>la </a:t>
-            </a:r>
-            <a:r>
-              <a:rPr lang="fr-FR" sz="1600" dirty="0" smtClean="0">
-                <a:effectLst/>
-                <a:latin typeface="Calibri" panose="020F0502020204030204" pitchFamily="34" charset="0"/>
-                <a:ea typeface="Calibri" panose="020F0502020204030204" pitchFamily="34" charset="0"/>
-                <a:cs typeface="Times New Roman" panose="02020603050405020304" pitchFamily="18" charset="0"/>
-              </a:rPr>
-              <a:t>BDD</a:t>
-            </a:r>
-          </a:p>
-          <a:p>
-            <a:pPr>
-              <a:lnSpc>
-                <a:spcPct val="107000"/>
-              </a:lnSpc>
-              <a:spcAft>
-                <a:spcPts val="800"/>
-              </a:spcAft>
-            </a:pPr>
-            <a:r>
-              <a:rPr lang="fr-FR" sz="1400" dirty="0" smtClean="0">
-                <a:effectLst/>
-                <a:latin typeface="Calibri" panose="020F0502020204030204" pitchFamily="34" charset="0"/>
-                <a:ea typeface="Calibri" panose="020F0502020204030204" pitchFamily="34" charset="0"/>
-                <a:cs typeface="Times New Roman" panose="02020603050405020304" pitchFamily="18" charset="0"/>
-              </a:rPr>
-              <a:t>5.1 Purger la BDD quand la date du fichier dépasse 1an</a:t>
-            </a:r>
-            <a:endParaRPr lang="fr-FR" sz="1400" dirty="0">
-              <a:effectLst/>
-              <a:latin typeface="Calibri" panose="020F0502020204030204" pitchFamily="34" charset="0"/>
-              <a:ea typeface="Calibri" panose="020F0502020204030204" pitchFamily="34" charset="0"/>
-              <a:cs typeface="Times New Roman" panose="02020603050405020304" pitchFamily="18" charset="0"/>
-            </a:endParaRPr>
-          </a:p>
-          <a:p>
-            <a:pPr>
-              <a:lnSpc>
-                <a:spcPct val="107000"/>
-              </a:lnSpc>
-              <a:spcAft>
-                <a:spcPts val="800"/>
-              </a:spcAft>
-            </a:pPr>
-            <a:r>
-              <a:rPr lang="fr-FR" sz="1600" dirty="0">
-                <a:effectLst/>
-                <a:latin typeface="Calibri" panose="020F0502020204030204" pitchFamily="34" charset="0"/>
-                <a:ea typeface="Calibri" panose="020F0502020204030204" pitchFamily="34" charset="0"/>
-                <a:cs typeface="Times New Roman" panose="02020603050405020304" pitchFamily="18" charset="0"/>
-              </a:rPr>
-              <a:t>6.   Afficher l’état du système</a:t>
-            </a:r>
-            <a:endParaRPr lang="fr-FR" sz="1400" dirty="0">
-              <a:effectLst/>
-              <a:latin typeface="Calibri" panose="020F0502020204030204" pitchFamily="34" charset="0"/>
-              <a:ea typeface="Calibri" panose="020F0502020204030204" pitchFamily="34" charset="0"/>
-              <a:cs typeface="Times New Roman" panose="02020603050405020304" pitchFamily="18" charset="0"/>
-            </a:endParaRPr>
-          </a:p>
-          <a:p>
-            <a:pPr>
-              <a:lnSpc>
-                <a:spcPct val="107000"/>
-              </a:lnSpc>
-              <a:spcAft>
-                <a:spcPts val="800"/>
-              </a:spcAft>
-            </a:pPr>
-            <a:r>
-              <a:rPr lang="fr-FR" sz="1600" dirty="0">
-                <a:effectLst/>
-                <a:latin typeface="Calibri" panose="020F0502020204030204" pitchFamily="34" charset="0"/>
-                <a:ea typeface="Calibri" panose="020F0502020204030204" pitchFamily="34" charset="0"/>
-                <a:cs typeface="Times New Roman" panose="02020603050405020304" pitchFamily="18" charset="0"/>
-              </a:rPr>
-              <a:t>      6.1 Les données instantanées de consommation d’eau seront affichés sur un site web</a:t>
-            </a:r>
-            <a:endParaRPr lang="fr-FR" sz="1400" dirty="0">
-              <a:effectLst/>
-              <a:latin typeface="Calibri" panose="020F0502020204030204" pitchFamily="34" charset="0"/>
-              <a:ea typeface="Calibri" panose="020F0502020204030204" pitchFamily="34" charset="0"/>
-              <a:cs typeface="Times New Roman" panose="02020603050405020304" pitchFamily="18" charset="0"/>
-            </a:endParaRPr>
-          </a:p>
-        </p:txBody>
-      </p:sp>
-    </p:spTree>
-    <p:extLst>
-      <p:ext uri="{BB962C8B-B14F-4D97-AF65-F5344CB8AC3E}">
-        <p14:creationId xmlns:p14="http://schemas.microsoft.com/office/powerpoint/2010/main" val="5633379"/>
+        <p14:creationId xmlns:p14="http://schemas.microsoft.com/office/powerpoint/2010/main" val="2715056959"/>
       </p:ext>
     </p:extLst>
   </p:cSld>
@@ -7441,78 +6951,107 @@
           <a:chExt cx="0" cy="0"/>
         </a:xfrm>
       </p:grpSpPr>
-      <p:sp>
-        <p:nvSpPr>
-          <p:cNvPr id="2" name="Titre 1"/>
-          <p:cNvSpPr>
-            <a:spLocks noGrp="1"/>
-          </p:cNvSpPr>
-          <p:nvPr>
-            <p:ph type="title"/>
-          </p:nvPr>
-        </p:nvSpPr>
-        <p:spPr>
-          <a:xfrm>
-            <a:off x="646111" y="452718"/>
-            <a:ext cx="9404723" cy="327675"/>
-          </a:xfrm>
-        </p:spPr>
-        <p:txBody>
-          <a:bodyPr/>
+      <p:pic>
+        <p:nvPicPr>
+          <p:cNvPr id="2" name="Image 1"/>
+          <p:cNvPicPr>
+            <a:picLocks noChangeAspect="1"/>
+          </p:cNvPicPr>
+          <p:nvPr/>
+        </p:nvPicPr>
+        <p:blipFill>
+          <a:blip r:embed="rId2">
+            <a:extLst>
+              <a:ext uri="{28A0092B-C50C-407E-A947-70E740481C1C}">
+                <a14:useLocalDpi xmlns:a14="http://schemas.microsoft.com/office/drawing/2010/main" val="0"/>
+              </a:ext>
+            </a:extLst>
+          </a:blip>
+          <a:stretch>
+            <a:fillRect/>
+          </a:stretch>
+        </p:blipFill>
+        <p:spPr>
+          <a:xfrm>
+            <a:off x="230750" y="714895"/>
+            <a:ext cx="11599188" cy="5748451"/>
+          </a:xfrm>
+          <a:prstGeom prst="rect">
+            <a:avLst/>
+          </a:prstGeom>
+        </p:spPr>
+      </p:pic>
+      <p:sp>
+        <p:nvSpPr>
+          <p:cNvPr id="3" name="Rectangle 2"/>
+          <p:cNvSpPr/>
+          <p:nvPr/>
+        </p:nvSpPr>
+        <p:spPr>
+          <a:xfrm>
+            <a:off x="230750" y="345563"/>
+            <a:ext cx="2589170" cy="369332"/>
+          </a:xfrm>
+          <a:prstGeom prst="rect">
+            <a:avLst/>
+          </a:prstGeom>
+        </p:spPr>
+        <p:txBody>
+          <a:bodyPr wrap="none">
+            <a:spAutoFit/>
+          </a:bodyPr>
           <a:lstStyle/>
           <a:p>
             <a:r>
-              <a:rPr lang="fr-FR" sz="1800" dirty="0">
+              <a:rPr lang="fr-FR" dirty="0">
                 <a:solidFill>
                   <a:srgbClr val="FF0000"/>
                 </a:solidFill>
               </a:rPr>
-              <a:t>VIII. Carte E/S</a:t>
-            </a:r>
-            <a:br>
-              <a:rPr lang="fr-FR" sz="1800" dirty="0">
-                <a:solidFill>
-                  <a:srgbClr val="FF0000"/>
-                </a:solidFill>
-              </a:rPr>
-            </a:br>
-            <a:endParaRPr lang="fr-FR" sz="1800" dirty="0"/>
-          </a:p>
-        </p:txBody>
-      </p:sp>
-      <p:pic>
-        <p:nvPicPr>
-          <p:cNvPr id="5" name="Image 4"/>
-          <p:cNvPicPr/>
+              <a:t>VI. Diagramme de classe</a:t>
+            </a:r>
+          </a:p>
+        </p:txBody>
+      </p:sp>
+      <p:sp>
+        <p:nvSpPr>
+          <p:cNvPr id="5" name="ZoneTexte 4">
+            <a:extLst>
+              <a:ext uri="{FF2B5EF4-FFF2-40B4-BE49-F238E27FC236}">
+                <a16:creationId xmlns:a16="http://schemas.microsoft.com/office/drawing/2014/main" id="{2AF41A51-1252-43EE-A92B-E094AFF9BF0F}"/>
+              </a:ext>
+            </a:extLst>
+          </p:cNvPr>
+          <p:cNvSpPr txBox="1"/>
           <p:nvPr/>
-        </p:nvPicPr>
-        <p:blipFill rotWithShape="1">
-          <a:blip r:embed="rId2"/>
-          <a:srcRect t="1061"/>
-          <a:stretch/>
-        </p:blipFill>
-        <p:spPr bwMode="auto">
-          <a:xfrm>
-            <a:off x="3389060" y="275898"/>
-            <a:ext cx="5069139" cy="6507448"/>
+        </p:nvSpPr>
+        <p:spPr>
+          <a:xfrm>
+            <a:off x="5553512" y="209988"/>
+            <a:ext cx="2080470" cy="369332"/>
           </a:xfrm>
           <a:prstGeom prst="rect">
             <a:avLst/>
           </a:prstGeom>
-          <a:ln>
-            <a:noFill/>
-          </a:ln>
-          <a:extLst>
-            <a:ext uri="{53640926-AAD7-44D8-BBD7-CCE9431645EC}">
-              <a14:shadowObscured xmlns:a14="http://schemas.microsoft.com/office/drawing/2010/main"/>
-            </a:ext>
-          </a:extLst>
-        </p:spPr>
-      </p:pic>
+          <a:noFill/>
+        </p:spPr>
+        <p:txBody>
+          <a:bodyPr wrap="square" rtlCol="0">
+            <a:spAutoFit/>
+          </a:bodyPr>
+          <a:lstStyle/>
+          <a:p>
+            <a:r>
+              <a:rPr lang="fr-FR" dirty="0"/>
+              <a:t>Etudiant  1</a:t>
+            </a:r>
+          </a:p>
+        </p:txBody>
+      </p:sp>
     </p:spTree>
     <p:extLst>
       <p:ext uri="{BB962C8B-B14F-4D97-AF65-F5344CB8AC3E}">
-        <p14:creationId xmlns:p14="http://schemas.microsoft.com/office/powerpoint/2010/main" val="3474273564"/>
+        <p14:creationId xmlns:p14="http://schemas.microsoft.com/office/powerpoint/2010/main" val="1276361415"/>
       </p:ext>
     </p:extLst>
   </p:cSld>
@@ -7548,61 +7087,69 @@
       </p:grpSpPr>
       <p:sp>
         <p:nvSpPr>
-          <p:cNvPr id="3" name="Espace réservé du contenu 2"/>
-          <p:cNvSpPr>
-            <a:spLocks noGrp="1"/>
-          </p:cNvSpPr>
-          <p:nvPr>
-            <p:ph idx="1"/>
-          </p:nvPr>
-        </p:nvSpPr>
-        <p:spPr>
-          <a:xfrm>
-            <a:off x="133733" y="168939"/>
-            <a:ext cx="8946541" cy="406503"/>
-          </a:xfrm>
-        </p:spPr>
-        <p:txBody>
-          <a:bodyPr>
-            <a:normAutofit/>
+          <p:cNvPr id="6" name="ZoneTexte 5">
+            <a:extLst>
+              <a:ext uri="{FF2B5EF4-FFF2-40B4-BE49-F238E27FC236}">
+                <a16:creationId xmlns:a16="http://schemas.microsoft.com/office/drawing/2014/main" id="{D3CF817F-0ABA-4F0A-9608-9CC5197078E8}"/>
+              </a:ext>
+            </a:extLst>
+          </p:cNvPr>
+          <p:cNvSpPr txBox="1"/>
+          <p:nvPr/>
+        </p:nvSpPr>
+        <p:spPr>
+          <a:xfrm>
+            <a:off x="5532539" y="167672"/>
+            <a:ext cx="2457975" cy="369332"/>
+          </a:xfrm>
+          <a:prstGeom prst="rect">
+            <a:avLst/>
+          </a:prstGeom>
+          <a:noFill/>
+        </p:spPr>
+        <p:txBody>
+          <a:bodyPr wrap="square" rtlCol="0">
+            <a:spAutoFit/>
           </a:bodyPr>
           <a:lstStyle/>
           <a:p>
-            <a:pPr marL="0" indent="0">
-              <a:buNone/>
-            </a:pPr>
-            <a:r>
-              <a:rPr lang="fr-FR" sz="1800" dirty="0" smtClean="0">
-                <a:solidFill>
-                  <a:srgbClr val="FF0000"/>
-                </a:solidFill>
-              </a:rPr>
-              <a:t>IX. Capteur de débit</a:t>
-            </a:r>
-            <a:endParaRPr lang="fr-FR" sz="1800" dirty="0">
-              <a:solidFill>
-                <a:srgbClr val="FF0000"/>
-              </a:solidFill>
-            </a:endParaRPr>
+            <a:r>
+              <a:rPr lang="fr-FR" dirty="0"/>
+              <a:t>Etudiant 3</a:t>
+            </a:r>
           </a:p>
         </p:txBody>
       </p:sp>
       <p:pic>
         <p:nvPicPr>
-          <p:cNvPr id="4" name="Image 3"/>
-          <p:cNvPicPr/>
+          <p:cNvPr id="8" name="Image 7">
+            <a:extLst>
+              <a:ext uri="{FF2B5EF4-FFF2-40B4-BE49-F238E27FC236}">
+                <a16:creationId xmlns:a16="http://schemas.microsoft.com/office/drawing/2014/main" id="{4732AAF5-7BC1-440A-9AFD-70B409DE87BF}"/>
+              </a:ext>
+            </a:extLst>
+          </p:cNvPr>
+          <p:cNvPicPr>
+            <a:picLocks noChangeAspect="1"/>
+          </p:cNvPicPr>
           <p:nvPr/>
         </p:nvPicPr>
         <p:blipFill>
-          <a:blip r:embed="rId2"/>
+          <a:blip r:embed="rId2">
+            <a:extLst>
+              <a:ext uri="{28A0092B-C50C-407E-A947-70E740481C1C}">
+                <a14:useLocalDpi xmlns:a14="http://schemas.microsoft.com/office/drawing/2010/main" val="0"/>
+              </a:ext>
+            </a:extLst>
+          </a:blip>
           <a:stretch>
             <a:fillRect/>
           </a:stretch>
         </p:blipFill>
         <p:spPr>
           <a:xfrm>
-            <a:off x="2995449" y="372190"/>
-            <a:ext cx="6004560" cy="6281073"/>
+            <a:off x="426462" y="1333850"/>
+            <a:ext cx="11577439" cy="4278385"/>
           </a:xfrm>
           <a:prstGeom prst="rect">
             <a:avLst/>
@@ -7612,13 +7159,20 @@
     </p:spTree>
     <p:extLst>
       <p:ext uri="{BB962C8B-B14F-4D97-AF65-F5344CB8AC3E}">
-        <p14:creationId xmlns:p14="http://schemas.microsoft.com/office/powerpoint/2010/main" val="840899611"/>
+        <p14:creationId xmlns:p14="http://schemas.microsoft.com/office/powerpoint/2010/main" val="2051653351"/>
       </p:ext>
     </p:extLst>
   </p:cSld>
   <p:clrMapOvr>
     <a:masterClrMapping/>
   </p:clrMapOvr>
+  <p:timing>
+    <p:tnLst>
+      <p:par>
+        <p:cTn id="1" dur="indefinite" restart="never" nodeType="tmRoot"/>
+      </p:par>
+    </p:tnLst>
+  </p:timing>
 </p:sld>
 </file>
 
@@ -7639,38 +7193,479 @@
           <a:chExt cx="0" cy="0"/>
         </a:xfrm>
       </p:grpSpPr>
-      <p:pic>
-        <p:nvPicPr>
-          <p:cNvPr id="4" name="Image 3"/>
-          <p:cNvPicPr/>
+      <p:sp>
+        <p:nvSpPr>
+          <p:cNvPr id="2" name="Rectangle 1"/>
+          <p:cNvSpPr/>
           <p:nvPr/>
-        </p:nvPicPr>
-        <p:blipFill>
-          <a:blip r:embed="rId2"/>
-          <a:stretch>
-            <a:fillRect/>
-          </a:stretch>
-        </p:blipFill>
-        <p:spPr>
-          <a:xfrm>
-            <a:off x="2829910" y="1529255"/>
-            <a:ext cx="6225277" cy="3296779"/>
+        </p:nvSpPr>
+        <p:spPr>
+          <a:xfrm>
+            <a:off x="262069" y="285003"/>
+            <a:ext cx="1393330" cy="369332"/>
           </a:xfrm>
           <a:prstGeom prst="rect">
             <a:avLst/>
           </a:prstGeom>
         </p:spPr>
-      </p:pic>
+        <p:txBody>
+          <a:bodyPr wrap="none">
+            <a:spAutoFit/>
+          </a:bodyPr>
+          <a:lstStyle/>
+          <a:p>
+            <a:r>
+              <a:rPr lang="fr-FR" dirty="0">
+                <a:solidFill>
+                  <a:srgbClr val="FF0000"/>
+                </a:solidFill>
+              </a:rPr>
+              <a:t>VII. Scénario</a:t>
+            </a:r>
+          </a:p>
+        </p:txBody>
+      </p:sp>
+      <p:sp>
+        <p:nvSpPr>
+          <p:cNvPr id="3" name="Rectangle 2"/>
+          <p:cNvSpPr/>
+          <p:nvPr/>
+        </p:nvSpPr>
+        <p:spPr>
+          <a:xfrm>
+            <a:off x="1147156" y="1191743"/>
+            <a:ext cx="10083338" cy="4421788"/>
+          </a:xfrm>
+          <a:prstGeom prst="rect">
+            <a:avLst/>
+          </a:prstGeom>
+        </p:spPr>
+        <p:txBody>
+          <a:bodyPr wrap="square">
+            <a:spAutoFit/>
+          </a:bodyPr>
+          <a:lstStyle/>
+          <a:p>
+            <a:pPr marL="342900" lvl="0" indent="-342900">
+              <a:lnSpc>
+                <a:spcPct val="107000"/>
+              </a:lnSpc>
+              <a:spcAft>
+                <a:spcPts val="0"/>
+              </a:spcAft>
+              <a:buFont typeface="+mj-lt"/>
+              <a:buAutoNum type="arabicPeriod"/>
+            </a:pPr>
+            <a:r>
+              <a:rPr lang="fr-FR" sz="1600" dirty="0">
+                <a:effectLst/>
+                <a:latin typeface="Calibri" panose="020F0502020204030204" pitchFamily="34" charset="0"/>
+                <a:ea typeface="Calibri" panose="020F0502020204030204" pitchFamily="34" charset="0"/>
+                <a:cs typeface="Times New Roman" panose="02020603050405020304" pitchFamily="18" charset="0"/>
+              </a:rPr>
+              <a:t>Le capteur mesure le niveau d’eau des cuves</a:t>
+            </a:r>
+            <a:endParaRPr lang="fr-FR" sz="1400" dirty="0">
+              <a:effectLst/>
+              <a:latin typeface="Calibri" panose="020F0502020204030204" pitchFamily="34" charset="0"/>
+              <a:ea typeface="Calibri" panose="020F0502020204030204" pitchFamily="34" charset="0"/>
+              <a:cs typeface="Times New Roman" panose="02020603050405020304" pitchFamily="18" charset="0"/>
+            </a:endParaRPr>
+          </a:p>
+          <a:p>
+            <a:pPr marL="742950" lvl="1" indent="-285750">
+              <a:lnSpc>
+                <a:spcPct val="107000"/>
+              </a:lnSpc>
+              <a:spcAft>
+                <a:spcPts val="0"/>
+              </a:spcAft>
+              <a:buFont typeface="+mj-lt"/>
+              <a:buAutoNum type="arabicPeriod"/>
+            </a:pPr>
+            <a:r>
+              <a:rPr lang="fr-FR" sz="1600" dirty="0">
+                <a:effectLst/>
+                <a:latin typeface="Calibri" panose="020F0502020204030204" pitchFamily="34" charset="0"/>
+                <a:ea typeface="Calibri" panose="020F0502020204030204" pitchFamily="34" charset="0"/>
+                <a:cs typeface="Times New Roman" panose="02020603050405020304" pitchFamily="18" charset="0"/>
+              </a:rPr>
+              <a:t>Si la cuve du toit n’est pas remplie et que celle de récupération l’est, activer la pompe de relevage</a:t>
+            </a:r>
+            <a:endParaRPr lang="fr-FR" sz="1400" dirty="0">
+              <a:effectLst/>
+              <a:latin typeface="Calibri" panose="020F0502020204030204" pitchFamily="34" charset="0"/>
+              <a:ea typeface="Calibri" panose="020F0502020204030204" pitchFamily="34" charset="0"/>
+              <a:cs typeface="Times New Roman" panose="02020603050405020304" pitchFamily="18" charset="0"/>
+            </a:endParaRPr>
+          </a:p>
+          <a:p>
+            <a:pPr marL="742950" lvl="1" indent="-285750">
+              <a:lnSpc>
+                <a:spcPct val="107000"/>
+              </a:lnSpc>
+              <a:spcAft>
+                <a:spcPts val="0"/>
+              </a:spcAft>
+              <a:buFont typeface="+mj-lt"/>
+              <a:buAutoNum type="arabicPeriod"/>
+            </a:pPr>
+            <a:r>
+              <a:rPr lang="fr-FR" sz="1600" dirty="0">
+                <a:effectLst/>
+                <a:latin typeface="Calibri" panose="020F0502020204030204" pitchFamily="34" charset="0"/>
+                <a:ea typeface="Calibri" panose="020F0502020204030204" pitchFamily="34" charset="0"/>
+                <a:cs typeface="Times New Roman" panose="02020603050405020304" pitchFamily="18" charset="0"/>
+              </a:rPr>
+              <a:t>Si la cuve du toit est pleine, le système utilise l’eau de pluie</a:t>
+            </a:r>
+            <a:endParaRPr lang="fr-FR" sz="1400" dirty="0">
+              <a:effectLst/>
+              <a:latin typeface="Calibri" panose="020F0502020204030204" pitchFamily="34" charset="0"/>
+              <a:ea typeface="Calibri" panose="020F0502020204030204" pitchFamily="34" charset="0"/>
+              <a:cs typeface="Times New Roman" panose="02020603050405020304" pitchFamily="18" charset="0"/>
+            </a:endParaRPr>
+          </a:p>
+          <a:p>
+            <a:pPr marL="742950" lvl="1" indent="-285750">
+              <a:lnSpc>
+                <a:spcPct val="107000"/>
+              </a:lnSpc>
+              <a:spcAft>
+                <a:spcPts val="0"/>
+              </a:spcAft>
+              <a:buFont typeface="+mj-lt"/>
+              <a:buAutoNum type="arabicPeriod"/>
+            </a:pPr>
+            <a:r>
+              <a:rPr lang="fr-FR" sz="1600" dirty="0">
+                <a:effectLst/>
+                <a:latin typeface="Calibri" panose="020F0502020204030204" pitchFamily="34" charset="0"/>
+                <a:ea typeface="Calibri" panose="020F0502020204030204" pitchFamily="34" charset="0"/>
+                <a:cs typeface="Times New Roman" panose="02020603050405020304" pitchFamily="18" charset="0"/>
+              </a:rPr>
+              <a:t>Si la cuve du toit et de récupération sont vides ou à un niveau critique (&lt;10 cm), utiliser l’eau courante.</a:t>
+            </a:r>
+            <a:endParaRPr lang="fr-FR" sz="1400" dirty="0">
+              <a:effectLst/>
+              <a:latin typeface="Calibri" panose="020F0502020204030204" pitchFamily="34" charset="0"/>
+              <a:ea typeface="Calibri" panose="020F0502020204030204" pitchFamily="34" charset="0"/>
+              <a:cs typeface="Times New Roman" panose="02020603050405020304" pitchFamily="18" charset="0"/>
+            </a:endParaRPr>
+          </a:p>
+          <a:p>
+            <a:pPr marL="342900" lvl="0" indent="-342900">
+              <a:lnSpc>
+                <a:spcPct val="107000"/>
+              </a:lnSpc>
+              <a:spcAft>
+                <a:spcPts val="0"/>
+              </a:spcAft>
+              <a:buFont typeface="+mj-lt"/>
+              <a:buAutoNum type="arabicPeriod"/>
+            </a:pPr>
+            <a:r>
+              <a:rPr lang="fr-FR" sz="1600" dirty="0">
+                <a:effectLst/>
+                <a:latin typeface="Calibri" panose="020F0502020204030204" pitchFamily="34" charset="0"/>
+                <a:ea typeface="Calibri" panose="020F0502020204030204" pitchFamily="34" charset="0"/>
+                <a:cs typeface="Times New Roman" panose="02020603050405020304" pitchFamily="18" charset="0"/>
+              </a:rPr>
+              <a:t>Le capteur mesure la température de l’air</a:t>
+            </a:r>
+            <a:endParaRPr lang="fr-FR" sz="1400" dirty="0">
+              <a:effectLst/>
+              <a:latin typeface="Calibri" panose="020F0502020204030204" pitchFamily="34" charset="0"/>
+              <a:ea typeface="Calibri" panose="020F0502020204030204" pitchFamily="34" charset="0"/>
+              <a:cs typeface="Times New Roman" panose="02020603050405020304" pitchFamily="18" charset="0"/>
+            </a:endParaRPr>
+          </a:p>
+          <a:p>
+            <a:pPr marL="228600">
+              <a:lnSpc>
+                <a:spcPct val="107000"/>
+              </a:lnSpc>
+              <a:spcAft>
+                <a:spcPts val="0"/>
+              </a:spcAft>
+            </a:pPr>
+            <a:r>
+              <a:rPr lang="fr-FR" sz="1600" dirty="0">
+                <a:effectLst/>
+                <a:latin typeface="Calibri" panose="020F0502020204030204" pitchFamily="34" charset="0"/>
+                <a:ea typeface="Calibri" panose="020F0502020204030204" pitchFamily="34" charset="0"/>
+                <a:cs typeface="Times New Roman" panose="02020603050405020304" pitchFamily="18" charset="0"/>
+              </a:rPr>
+              <a:t>2.1 Si la température est égale ou inférieure à zéro, le système utilise l’eau courante</a:t>
+            </a:r>
+            <a:endParaRPr lang="fr-FR" sz="1400" dirty="0">
+              <a:effectLst/>
+              <a:latin typeface="Calibri" panose="020F0502020204030204" pitchFamily="34" charset="0"/>
+              <a:ea typeface="Calibri" panose="020F0502020204030204" pitchFamily="34" charset="0"/>
+              <a:cs typeface="Times New Roman" panose="02020603050405020304" pitchFamily="18" charset="0"/>
+            </a:endParaRPr>
+          </a:p>
+          <a:p>
+            <a:pPr marL="228600">
+              <a:lnSpc>
+                <a:spcPct val="107000"/>
+              </a:lnSpc>
+              <a:spcAft>
+                <a:spcPts val="0"/>
+              </a:spcAft>
+            </a:pPr>
+            <a:r>
+              <a:rPr lang="fr-FR" sz="1600" dirty="0">
+                <a:effectLst/>
+                <a:latin typeface="Calibri" panose="020F0502020204030204" pitchFamily="34" charset="0"/>
+                <a:ea typeface="Calibri" panose="020F0502020204030204" pitchFamily="34" charset="0"/>
+                <a:cs typeface="Times New Roman" panose="02020603050405020304" pitchFamily="18" charset="0"/>
+              </a:rPr>
+              <a:t> </a:t>
+            </a:r>
+            <a:endParaRPr lang="fr-FR" sz="1400" dirty="0">
+              <a:effectLst/>
+              <a:latin typeface="Calibri" panose="020F0502020204030204" pitchFamily="34" charset="0"/>
+              <a:ea typeface="Calibri" panose="020F0502020204030204" pitchFamily="34" charset="0"/>
+              <a:cs typeface="Times New Roman" panose="02020603050405020304" pitchFamily="18" charset="0"/>
+            </a:endParaRPr>
+          </a:p>
+          <a:p>
+            <a:pPr marL="342900" lvl="0" indent="-342900">
+              <a:lnSpc>
+                <a:spcPct val="107000"/>
+              </a:lnSpc>
+              <a:spcAft>
+                <a:spcPts val="0"/>
+              </a:spcAft>
+              <a:buFont typeface="+mj-lt"/>
+              <a:buAutoNum type="arabicPeriod"/>
+            </a:pPr>
+            <a:r>
+              <a:rPr lang="fr-FR" sz="1600" dirty="0">
+                <a:effectLst/>
+                <a:latin typeface="Calibri" panose="020F0502020204030204" pitchFamily="34" charset="0"/>
+                <a:ea typeface="Calibri" panose="020F0502020204030204" pitchFamily="34" charset="0"/>
+                <a:cs typeface="Times New Roman" panose="02020603050405020304" pitchFamily="18" charset="0"/>
+              </a:rPr>
+              <a:t>La serre est alimentée en eau</a:t>
+            </a:r>
+            <a:endParaRPr lang="fr-FR" sz="1400" dirty="0">
+              <a:effectLst/>
+              <a:latin typeface="Calibri" panose="020F0502020204030204" pitchFamily="34" charset="0"/>
+              <a:ea typeface="Calibri" panose="020F0502020204030204" pitchFamily="34" charset="0"/>
+              <a:cs typeface="Times New Roman" panose="02020603050405020304" pitchFamily="18" charset="0"/>
+            </a:endParaRPr>
+          </a:p>
+          <a:p>
+            <a:pPr marL="342900" lvl="0" indent="-342900">
+              <a:lnSpc>
+                <a:spcPct val="107000"/>
+              </a:lnSpc>
+              <a:spcAft>
+                <a:spcPts val="0"/>
+              </a:spcAft>
+              <a:buFont typeface="+mj-lt"/>
+              <a:buAutoNum type="arabicPeriod"/>
+            </a:pPr>
+            <a:r>
+              <a:rPr lang="fr-FR" sz="1600" dirty="0">
+                <a:effectLst/>
+                <a:latin typeface="Calibri" panose="020F0502020204030204" pitchFamily="34" charset="0"/>
+                <a:ea typeface="Calibri" panose="020F0502020204030204" pitchFamily="34" charset="0"/>
+                <a:cs typeface="Times New Roman" panose="02020603050405020304" pitchFamily="18" charset="0"/>
+              </a:rPr>
+              <a:t>Le système mesure la consommation en eau de la serre sur les deux réseaux (eau de pluie et eau courante)</a:t>
+            </a:r>
+            <a:endParaRPr lang="fr-FR" sz="1400" dirty="0">
+              <a:effectLst/>
+              <a:latin typeface="Calibri" panose="020F0502020204030204" pitchFamily="34" charset="0"/>
+              <a:ea typeface="Calibri" panose="020F0502020204030204" pitchFamily="34" charset="0"/>
+              <a:cs typeface="Times New Roman" panose="02020603050405020304" pitchFamily="18" charset="0"/>
+            </a:endParaRPr>
+          </a:p>
+          <a:p>
+            <a:pPr marL="228600">
+              <a:lnSpc>
+                <a:spcPct val="107000"/>
+              </a:lnSpc>
+              <a:spcAft>
+                <a:spcPts val="0"/>
+              </a:spcAft>
+            </a:pPr>
+            <a:r>
+              <a:rPr lang="fr-FR" sz="1600" dirty="0">
+                <a:effectLst/>
+                <a:latin typeface="Calibri" panose="020F0502020204030204" pitchFamily="34" charset="0"/>
+                <a:ea typeface="Calibri" panose="020F0502020204030204" pitchFamily="34" charset="0"/>
+                <a:cs typeface="Times New Roman" panose="02020603050405020304" pitchFamily="18" charset="0"/>
+              </a:rPr>
+              <a:t>4.1 Enregistrer la consommation d’eau heure par heure dans la BDD</a:t>
+            </a:r>
+            <a:endParaRPr lang="fr-FR" sz="1400" dirty="0">
+              <a:effectLst/>
+              <a:latin typeface="Calibri" panose="020F0502020204030204" pitchFamily="34" charset="0"/>
+              <a:ea typeface="Calibri" panose="020F0502020204030204" pitchFamily="34" charset="0"/>
+              <a:cs typeface="Times New Roman" panose="02020603050405020304" pitchFamily="18" charset="0"/>
+            </a:endParaRPr>
+          </a:p>
+          <a:p>
+            <a:pPr marL="228600">
+              <a:lnSpc>
+                <a:spcPct val="107000"/>
+              </a:lnSpc>
+              <a:spcAft>
+                <a:spcPts val="800"/>
+              </a:spcAft>
+            </a:pPr>
+            <a:r>
+              <a:rPr lang="fr-FR" sz="1600" dirty="0">
+                <a:effectLst/>
+                <a:latin typeface="Calibri" panose="020F0502020204030204" pitchFamily="34" charset="0"/>
+                <a:ea typeface="Calibri" panose="020F0502020204030204" pitchFamily="34" charset="0"/>
+                <a:cs typeface="Times New Roman" panose="02020603050405020304" pitchFamily="18" charset="0"/>
+              </a:rPr>
+              <a:t>4.2 Afficher sous forme graphique les données de consommation d’eau par période</a:t>
+            </a:r>
+            <a:endParaRPr lang="fr-FR" sz="1400" dirty="0">
+              <a:effectLst/>
+              <a:latin typeface="Calibri" panose="020F0502020204030204" pitchFamily="34" charset="0"/>
+              <a:ea typeface="Calibri" panose="020F0502020204030204" pitchFamily="34" charset="0"/>
+              <a:cs typeface="Times New Roman" panose="02020603050405020304" pitchFamily="18" charset="0"/>
+            </a:endParaRPr>
+          </a:p>
+          <a:p>
+            <a:pPr marL="342900" indent="-342900">
+              <a:lnSpc>
+                <a:spcPct val="107000"/>
+              </a:lnSpc>
+              <a:spcAft>
+                <a:spcPts val="800"/>
+              </a:spcAft>
+              <a:buAutoNum type="arabicPeriod" startAt="5"/>
+            </a:pPr>
+            <a:r>
+              <a:rPr lang="fr-FR" sz="1600" dirty="0" smtClean="0">
+                <a:effectLst/>
+                <a:latin typeface="Calibri" panose="020F0502020204030204" pitchFamily="34" charset="0"/>
+                <a:ea typeface="Calibri" panose="020F0502020204030204" pitchFamily="34" charset="0"/>
+                <a:cs typeface="Times New Roman" panose="02020603050405020304" pitchFamily="18" charset="0"/>
+              </a:rPr>
+              <a:t>Administrer </a:t>
+            </a:r>
+            <a:r>
+              <a:rPr lang="fr-FR" sz="1600" dirty="0">
+                <a:effectLst/>
+                <a:latin typeface="Calibri" panose="020F0502020204030204" pitchFamily="34" charset="0"/>
+                <a:ea typeface="Calibri" panose="020F0502020204030204" pitchFamily="34" charset="0"/>
+                <a:cs typeface="Times New Roman" panose="02020603050405020304" pitchFamily="18" charset="0"/>
+              </a:rPr>
+              <a:t>la </a:t>
+            </a:r>
+            <a:r>
+              <a:rPr lang="fr-FR" sz="1600" dirty="0" smtClean="0">
+                <a:effectLst/>
+                <a:latin typeface="Calibri" panose="020F0502020204030204" pitchFamily="34" charset="0"/>
+                <a:ea typeface="Calibri" panose="020F0502020204030204" pitchFamily="34" charset="0"/>
+                <a:cs typeface="Times New Roman" panose="02020603050405020304" pitchFamily="18" charset="0"/>
+              </a:rPr>
+              <a:t>BDD</a:t>
+            </a:r>
+          </a:p>
+          <a:p>
+            <a:pPr>
+              <a:lnSpc>
+                <a:spcPct val="107000"/>
+              </a:lnSpc>
+              <a:spcAft>
+                <a:spcPts val="800"/>
+              </a:spcAft>
+            </a:pPr>
+            <a:r>
+              <a:rPr lang="fr-FR" sz="1400" dirty="0" smtClean="0">
+                <a:effectLst/>
+                <a:latin typeface="Calibri" panose="020F0502020204030204" pitchFamily="34" charset="0"/>
+                <a:ea typeface="Calibri" panose="020F0502020204030204" pitchFamily="34" charset="0"/>
+                <a:cs typeface="Times New Roman" panose="02020603050405020304" pitchFamily="18" charset="0"/>
+              </a:rPr>
+              <a:t>5.1 Purger la BDD quand la date du fichier dépasse 1an</a:t>
+            </a:r>
+            <a:endParaRPr lang="fr-FR" sz="1400" dirty="0">
+              <a:effectLst/>
+              <a:latin typeface="Calibri" panose="020F0502020204030204" pitchFamily="34" charset="0"/>
+              <a:ea typeface="Calibri" panose="020F0502020204030204" pitchFamily="34" charset="0"/>
+              <a:cs typeface="Times New Roman" panose="02020603050405020304" pitchFamily="18" charset="0"/>
+            </a:endParaRPr>
+          </a:p>
+          <a:p>
+            <a:pPr>
+              <a:lnSpc>
+                <a:spcPct val="107000"/>
+              </a:lnSpc>
+              <a:spcAft>
+                <a:spcPts val="800"/>
+              </a:spcAft>
+            </a:pPr>
+            <a:r>
+              <a:rPr lang="fr-FR" sz="1600" dirty="0">
+                <a:effectLst/>
+                <a:latin typeface="Calibri" panose="020F0502020204030204" pitchFamily="34" charset="0"/>
+                <a:ea typeface="Calibri" panose="020F0502020204030204" pitchFamily="34" charset="0"/>
+                <a:cs typeface="Times New Roman" panose="02020603050405020304" pitchFamily="18" charset="0"/>
+              </a:rPr>
+              <a:t>6.   Afficher l’état du système</a:t>
+            </a:r>
+            <a:endParaRPr lang="fr-FR" sz="1400" dirty="0">
+              <a:effectLst/>
+              <a:latin typeface="Calibri" panose="020F0502020204030204" pitchFamily="34" charset="0"/>
+              <a:ea typeface="Calibri" panose="020F0502020204030204" pitchFamily="34" charset="0"/>
+              <a:cs typeface="Times New Roman" panose="02020603050405020304" pitchFamily="18" charset="0"/>
+            </a:endParaRPr>
+          </a:p>
+          <a:p>
+            <a:pPr>
+              <a:lnSpc>
+                <a:spcPct val="107000"/>
+              </a:lnSpc>
+              <a:spcAft>
+                <a:spcPts val="800"/>
+              </a:spcAft>
+            </a:pPr>
+            <a:r>
+              <a:rPr lang="fr-FR" sz="1600" dirty="0">
+                <a:effectLst/>
+                <a:latin typeface="Calibri" panose="020F0502020204030204" pitchFamily="34" charset="0"/>
+                <a:ea typeface="Calibri" panose="020F0502020204030204" pitchFamily="34" charset="0"/>
+                <a:cs typeface="Times New Roman" panose="02020603050405020304" pitchFamily="18" charset="0"/>
+              </a:rPr>
+              <a:t>      6.1 Les données instantanées de consommation d’eau seront affichés sur un site web</a:t>
+            </a:r>
+            <a:endParaRPr lang="fr-FR" sz="1400" dirty="0">
+              <a:effectLst/>
+              <a:latin typeface="Calibri" panose="020F0502020204030204" pitchFamily="34" charset="0"/>
+              <a:ea typeface="Calibri" panose="020F0502020204030204" pitchFamily="34" charset="0"/>
+              <a:cs typeface="Times New Roman" panose="02020603050405020304" pitchFamily="18" charset="0"/>
+            </a:endParaRPr>
+          </a:p>
+        </p:txBody>
+      </p:sp>
     </p:spTree>
     <p:extLst>
       <p:ext uri="{BB962C8B-B14F-4D97-AF65-F5344CB8AC3E}">
-        <p14:creationId xmlns:p14="http://schemas.microsoft.com/office/powerpoint/2010/main" val="4095895974"/>
+        <p14:creationId xmlns:p14="http://schemas.microsoft.com/office/powerpoint/2010/main" val="5633379"/>
       </p:ext>
     </p:extLst>
   </p:cSld>
   <p:clrMapOvr>
     <a:masterClrMapping/>
   </p:clrMapOvr>
+  <p:timing>
+    <p:tnLst>
+      <p:par>
+        <p:cTn id="1" dur="indefinite" restart="never" nodeType="tmRoot"/>
+      </p:par>
+    </p:tnLst>
+  </p:timing>
 </p:sld>
 </file>
 
@@ -7693,13 +7688,7 @@
       </p:grpSpPr>
       <p:sp>
         <p:nvSpPr>
-          <p:cNvPr id="2" name="Titre 1">
-            <a:extLst>
-              <a:ext uri="{FF2B5EF4-FFF2-40B4-BE49-F238E27FC236}">
-                <a16:creationId xmlns:a16="http://schemas.microsoft.com/office/drawing/2014/main" id="{3026004A-87E6-4DED-B667-257A29000D7F}"/>
-              </a:ext>
-            </a:extLst>
-          </p:cNvPr>
+          <p:cNvPr id="2" name="Titre 1"/>
           <p:cNvSpPr>
             <a:spLocks noGrp="1"/>
           </p:cNvSpPr>
@@ -7709,104 +7698,66 @@
         </p:nvSpPr>
         <p:spPr>
           <a:xfrm>
-            <a:off x="675313" y="0"/>
-            <a:ext cx="9601200" cy="536895"/>
-          </a:xfrm>
-        </p:spPr>
-        <p:txBody>
-          <a:bodyPr>
-            <a:normAutofit/>
-          </a:bodyPr>
+            <a:off x="646111" y="452718"/>
+            <a:ext cx="9404723" cy="327675"/>
+          </a:xfrm>
+        </p:spPr>
+        <p:txBody>
+          <a:bodyPr/>
           <a:lstStyle/>
           <a:p>
-            <a:r>
-              <a:rPr lang="fr-FR" sz="1800" dirty="0" smtClean="0">
-                <a:solidFill>
-                  <a:srgbClr val="FF0000"/>
-                </a:solidFill>
-              </a:rPr>
-              <a:t>X. </a:t>
-            </a:r>
             <a:r>
               <a:rPr lang="fr-FR" sz="1800" dirty="0">
                 <a:solidFill>
                   <a:srgbClr val="FF0000"/>
                 </a:solidFill>
               </a:rPr>
-              <a:t>Proposition de capteur</a:t>
-            </a:r>
+              <a:t>VIII. Carte E/S</a:t>
+            </a:r>
+            <a:br>
+              <a:rPr lang="fr-FR" sz="1800" dirty="0">
+                <a:solidFill>
+                  <a:srgbClr val="FF0000"/>
+                </a:solidFill>
+              </a:rPr>
+            </a:br>
+            <a:endParaRPr lang="fr-FR" sz="1800" dirty="0"/>
           </a:p>
         </p:txBody>
       </p:sp>
       <p:pic>
         <p:nvPicPr>
-          <p:cNvPr id="4" name="Image 3">
-            <a:extLst>
-              <a:ext uri="{FF2B5EF4-FFF2-40B4-BE49-F238E27FC236}">
-                <a16:creationId xmlns:a16="http://schemas.microsoft.com/office/drawing/2014/main" id="{8417A30D-E612-424E-974F-79EDE048DB8E}"/>
-              </a:ext>
-            </a:extLst>
-          </p:cNvPr>
-          <p:cNvPicPr>
-            <a:picLocks noChangeAspect="1"/>
-          </p:cNvPicPr>
+          <p:cNvPr id="5" name="Image 4"/>
+          <p:cNvPicPr/>
           <p:nvPr/>
         </p:nvPicPr>
-        <p:blipFill>
+        <p:blipFill rotWithShape="1">
           <a:blip r:embed="rId2"/>
-          <a:stretch>
-            <a:fillRect/>
-          </a:stretch>
+          <a:srcRect t="1061"/>
+          <a:stretch/>
         </p:blipFill>
-        <p:spPr>
-          <a:xfrm>
-            <a:off x="366712" y="347706"/>
-            <a:ext cx="11458575" cy="3981450"/>
+        <p:spPr bwMode="auto">
+          <a:xfrm>
+            <a:off x="3389060" y="275898"/>
+            <a:ext cx="5069139" cy="6507448"/>
           </a:xfrm>
           <a:prstGeom prst="rect">
             <a:avLst/>
           </a:prstGeom>
+          <a:ln>
+            <a:noFill/>
+          </a:ln>
+          <a:extLst>
+            <a:ext uri="{53640926-AAD7-44D8-BBD7-CCE9431645EC}">
+              <a14:shadowObscured xmlns:a14="http://schemas.microsoft.com/office/drawing/2010/main"/>
+            </a:ext>
+          </a:extLst>
         </p:spPr>
       </p:pic>
-      <p:sp>
-        <p:nvSpPr>
-          <p:cNvPr id="5" name="ZoneTexte 4">
-            <a:extLst>
-              <a:ext uri="{FF2B5EF4-FFF2-40B4-BE49-F238E27FC236}">
-                <a16:creationId xmlns:a16="http://schemas.microsoft.com/office/drawing/2014/main" id="{CD23AE6B-0101-4951-B5AC-C56F2FF99B1A}"/>
-              </a:ext>
-            </a:extLst>
-          </p:cNvPr>
-          <p:cNvSpPr txBox="1"/>
-          <p:nvPr/>
-        </p:nvSpPr>
-        <p:spPr>
-          <a:xfrm>
-            <a:off x="3323635" y="4329156"/>
-            <a:ext cx="5544728" cy="369332"/>
-          </a:xfrm>
-          <a:prstGeom prst="rect">
-            <a:avLst/>
-          </a:prstGeom>
-          <a:noFill/>
-        </p:spPr>
-        <p:txBody>
-          <a:bodyPr wrap="square" rtlCol="0">
-            <a:spAutoFit/>
-          </a:bodyPr>
-          <a:lstStyle/>
-          <a:p>
-            <a:r>
-              <a:rPr lang="fr-FR" dirty="0"/>
-              <a:t>Capteur de Température et de niveau d’eau.</a:t>
-            </a:r>
-          </a:p>
-        </p:txBody>
-      </p:sp>
     </p:spTree>
     <p:extLst>
       <p:ext uri="{BB962C8B-B14F-4D97-AF65-F5344CB8AC3E}">
-        <p14:creationId xmlns:p14="http://schemas.microsoft.com/office/powerpoint/2010/main" val="1403222135"/>
+        <p14:creationId xmlns:p14="http://schemas.microsoft.com/office/powerpoint/2010/main" val="3474273564"/>
       </p:ext>
     </p:extLst>
   </p:cSld>
@@ -7840,18 +7791,51 @@
           <a:chExt cx="0" cy="0"/>
         </a:xfrm>
       </p:grpSpPr>
+      <p:sp>
+        <p:nvSpPr>
+          <p:cNvPr id="3" name="Espace réservé du contenu 2"/>
+          <p:cNvSpPr>
+            <a:spLocks noGrp="1"/>
+          </p:cNvSpPr>
+          <p:nvPr>
+            <p:ph idx="1"/>
+          </p:nvPr>
+        </p:nvSpPr>
+        <p:spPr>
+          <a:xfrm>
+            <a:off x="133733" y="168939"/>
+            <a:ext cx="8946541" cy="406503"/>
+          </a:xfrm>
+        </p:spPr>
+        <p:txBody>
+          <a:bodyPr>
+            <a:normAutofit/>
+          </a:bodyPr>
+          <a:lstStyle/>
+          <a:p>
+            <a:pPr marL="0" indent="0">
+              <a:buNone/>
+            </a:pPr>
+            <a:r>
+              <a:rPr lang="fr-FR" sz="1800" dirty="0" smtClean="0">
+                <a:solidFill>
+                  <a:srgbClr val="FF0000"/>
+                </a:solidFill>
+              </a:rPr>
+              <a:t>IX. Capteur de débit</a:t>
+            </a:r>
+            <a:endParaRPr lang="fr-FR" sz="1800" dirty="0">
+              <a:solidFill>
+                <a:srgbClr val="FF0000"/>
+              </a:solidFill>
+            </a:endParaRPr>
+          </a:p>
+        </p:txBody>
+      </p:sp>
       <p:pic>
         <p:nvPicPr>
-          <p:cNvPr id="4" name="Image 3">
-            <a:extLst>
-              <a:ext uri="{FF2B5EF4-FFF2-40B4-BE49-F238E27FC236}">
-                <a16:creationId xmlns:a16="http://schemas.microsoft.com/office/drawing/2014/main" id="{96B54DF2-DEAA-47D8-B69D-9BE28262E8BE}"/>
-              </a:ext>
-            </a:extLst>
-          </p:cNvPr>
-          <p:cNvPicPr>
-            <a:picLocks noChangeAspect="1"/>
-          </p:cNvPicPr>
+          <p:cNvPr id="4" name="Image 3"/>
+          <p:cNvPicPr/>
           <p:nvPr/>
         </p:nvPicPr>
         <p:blipFill>
@@ -7862,38 +7846,8 @@
         </p:blipFill>
         <p:spPr>
           <a:xfrm>
-            <a:off x="602506" y="0"/>
-            <a:ext cx="5148249" cy="6858000"/>
-          </a:xfrm>
-          <a:prstGeom prst="rect">
-            <a:avLst/>
-          </a:prstGeom>
-        </p:spPr>
-      </p:pic>
-      <p:pic>
-        <p:nvPicPr>
-          <p:cNvPr id="5" name="Image 4">
-            <a:extLst>
-              <a:ext uri="{FF2B5EF4-FFF2-40B4-BE49-F238E27FC236}">
-                <a16:creationId xmlns:a16="http://schemas.microsoft.com/office/drawing/2014/main" id="{FED7D196-6067-4E1B-8A70-F985604B24BB}"/>
-              </a:ext>
-            </a:extLst>
-          </p:cNvPr>
-          <p:cNvPicPr>
-            <a:picLocks noChangeAspect="1"/>
-          </p:cNvPicPr>
-          <p:nvPr/>
-        </p:nvPicPr>
-        <p:blipFill>
-          <a:blip r:embed="rId3"/>
-          <a:stretch>
-            <a:fillRect/>
-          </a:stretch>
-        </p:blipFill>
-        <p:spPr>
-          <a:xfrm>
-            <a:off x="6206516" y="0"/>
-            <a:ext cx="5215034" cy="6858000"/>
+            <a:off x="2995449" y="372190"/>
+            <a:ext cx="6004560" cy="6281073"/>
           </a:xfrm>
           <a:prstGeom prst="rect">
             <a:avLst/>
@@ -7903,20 +7857,13 @@
     </p:spTree>
     <p:extLst>
       <p:ext uri="{BB962C8B-B14F-4D97-AF65-F5344CB8AC3E}">
-        <p14:creationId xmlns:p14="http://schemas.microsoft.com/office/powerpoint/2010/main" val="1043868686"/>
+        <p14:creationId xmlns:p14="http://schemas.microsoft.com/office/powerpoint/2010/main" val="840899611"/>
       </p:ext>
     </p:extLst>
   </p:cSld>
   <p:clrMapOvr>
     <a:masterClrMapping/>
   </p:clrMapOvr>
-  <p:timing>
-    <p:tnLst>
-      <p:par>
-        <p:cTn id="1" dur="indefinite" restart="never" nodeType="tmRoot"/>
-      </p:par>
-    </p:tnLst>
-  </p:timing>
 </p:sld>
 </file>
 
@@ -8155,6 +8102,304 @@
       </p:grpSpPr>
       <p:pic>
         <p:nvPicPr>
+          <p:cNvPr id="4" name="Image 3"/>
+          <p:cNvPicPr/>
+          <p:nvPr/>
+        </p:nvPicPr>
+        <p:blipFill>
+          <a:blip r:embed="rId2"/>
+          <a:stretch>
+            <a:fillRect/>
+          </a:stretch>
+        </p:blipFill>
+        <p:spPr>
+          <a:xfrm>
+            <a:off x="2829910" y="1529255"/>
+            <a:ext cx="6225277" cy="3296779"/>
+          </a:xfrm>
+          <a:prstGeom prst="rect">
+            <a:avLst/>
+          </a:prstGeom>
+        </p:spPr>
+      </p:pic>
+    </p:spTree>
+    <p:extLst>
+      <p:ext uri="{BB962C8B-B14F-4D97-AF65-F5344CB8AC3E}">
+        <p14:creationId xmlns:p14="http://schemas.microsoft.com/office/powerpoint/2010/main" val="4095895974"/>
+      </p:ext>
+    </p:extLst>
+  </p:cSld>
+  <p:clrMapOvr>
+    <a:masterClrMapping/>
+  </p:clrMapOvr>
+</p:sld>
+</file>
+
+<file path=ppt/slides/slide21.xml><?xml version="1.0" encoding="utf-8"?>
+<p:sld xmlns:a="http://schemas.openxmlformats.org/drawingml/2006/main" xmlns:r="http://schemas.openxmlformats.org/officeDocument/2006/relationships" xmlns:p="http://schemas.openxmlformats.org/presentationml/2006/main">
+  <p:cSld>
+    <p:spTree>
+      <p:nvGrpSpPr>
+        <p:cNvPr id="1" name=""/>
+        <p:cNvGrpSpPr/>
+        <p:nvPr/>
+      </p:nvGrpSpPr>
+      <p:grpSpPr>
+        <a:xfrm>
+          <a:off x="0" y="0"/>
+          <a:ext cx="0" cy="0"/>
+          <a:chOff x="0" y="0"/>
+          <a:chExt cx="0" cy="0"/>
+        </a:xfrm>
+      </p:grpSpPr>
+      <p:sp>
+        <p:nvSpPr>
+          <p:cNvPr id="2" name="Titre 1">
+            <a:extLst>
+              <a:ext uri="{FF2B5EF4-FFF2-40B4-BE49-F238E27FC236}">
+                <a16:creationId xmlns:a16="http://schemas.microsoft.com/office/drawing/2014/main" id="{3026004A-87E6-4DED-B667-257A29000D7F}"/>
+              </a:ext>
+            </a:extLst>
+          </p:cNvPr>
+          <p:cNvSpPr>
+            <a:spLocks noGrp="1"/>
+          </p:cNvSpPr>
+          <p:nvPr>
+            <p:ph type="title"/>
+          </p:nvPr>
+        </p:nvSpPr>
+        <p:spPr>
+          <a:xfrm>
+            <a:off x="675313" y="0"/>
+            <a:ext cx="9601200" cy="536895"/>
+          </a:xfrm>
+        </p:spPr>
+        <p:txBody>
+          <a:bodyPr>
+            <a:normAutofit/>
+          </a:bodyPr>
+          <a:lstStyle/>
+          <a:p>
+            <a:r>
+              <a:rPr lang="fr-FR" sz="1800" dirty="0" smtClean="0">
+                <a:solidFill>
+                  <a:srgbClr val="FF0000"/>
+                </a:solidFill>
+              </a:rPr>
+              <a:t>X. </a:t>
+            </a:r>
+            <a:r>
+              <a:rPr lang="fr-FR" sz="1800" dirty="0">
+                <a:solidFill>
+                  <a:srgbClr val="FF0000"/>
+                </a:solidFill>
+              </a:rPr>
+              <a:t>Proposition de capteur</a:t>
+            </a:r>
+          </a:p>
+        </p:txBody>
+      </p:sp>
+      <p:pic>
+        <p:nvPicPr>
+          <p:cNvPr id="4" name="Image 3">
+            <a:extLst>
+              <a:ext uri="{FF2B5EF4-FFF2-40B4-BE49-F238E27FC236}">
+                <a16:creationId xmlns:a16="http://schemas.microsoft.com/office/drawing/2014/main" id="{8417A30D-E612-424E-974F-79EDE048DB8E}"/>
+              </a:ext>
+            </a:extLst>
+          </p:cNvPr>
+          <p:cNvPicPr>
+            <a:picLocks noChangeAspect="1"/>
+          </p:cNvPicPr>
+          <p:nvPr/>
+        </p:nvPicPr>
+        <p:blipFill>
+          <a:blip r:embed="rId2"/>
+          <a:stretch>
+            <a:fillRect/>
+          </a:stretch>
+        </p:blipFill>
+        <p:spPr>
+          <a:xfrm>
+            <a:off x="366712" y="347706"/>
+            <a:ext cx="11458575" cy="3981450"/>
+          </a:xfrm>
+          <a:prstGeom prst="rect">
+            <a:avLst/>
+          </a:prstGeom>
+        </p:spPr>
+      </p:pic>
+      <p:sp>
+        <p:nvSpPr>
+          <p:cNvPr id="5" name="ZoneTexte 4">
+            <a:extLst>
+              <a:ext uri="{FF2B5EF4-FFF2-40B4-BE49-F238E27FC236}">
+                <a16:creationId xmlns:a16="http://schemas.microsoft.com/office/drawing/2014/main" id="{CD23AE6B-0101-4951-B5AC-C56F2FF99B1A}"/>
+              </a:ext>
+            </a:extLst>
+          </p:cNvPr>
+          <p:cNvSpPr txBox="1"/>
+          <p:nvPr/>
+        </p:nvSpPr>
+        <p:spPr>
+          <a:xfrm>
+            <a:off x="3323635" y="4329156"/>
+            <a:ext cx="5544728" cy="369332"/>
+          </a:xfrm>
+          <a:prstGeom prst="rect">
+            <a:avLst/>
+          </a:prstGeom>
+          <a:noFill/>
+        </p:spPr>
+        <p:txBody>
+          <a:bodyPr wrap="square" rtlCol="0">
+            <a:spAutoFit/>
+          </a:bodyPr>
+          <a:lstStyle/>
+          <a:p>
+            <a:r>
+              <a:rPr lang="fr-FR" dirty="0"/>
+              <a:t>Capteur de Température et de niveau d’eau.</a:t>
+            </a:r>
+          </a:p>
+        </p:txBody>
+      </p:sp>
+    </p:spTree>
+    <p:extLst>
+      <p:ext uri="{BB962C8B-B14F-4D97-AF65-F5344CB8AC3E}">
+        <p14:creationId xmlns:p14="http://schemas.microsoft.com/office/powerpoint/2010/main" val="1403222135"/>
+      </p:ext>
+    </p:extLst>
+  </p:cSld>
+  <p:clrMapOvr>
+    <a:masterClrMapping/>
+  </p:clrMapOvr>
+  <p:timing>
+    <p:tnLst>
+      <p:par>
+        <p:cTn id="1" dur="indefinite" restart="never" nodeType="tmRoot"/>
+      </p:par>
+    </p:tnLst>
+  </p:timing>
+</p:sld>
+</file>
+
+<file path=ppt/slides/slide22.xml><?xml version="1.0" encoding="utf-8"?>
+<p:sld xmlns:a="http://schemas.openxmlformats.org/drawingml/2006/main" xmlns:r="http://schemas.openxmlformats.org/officeDocument/2006/relationships" xmlns:p="http://schemas.openxmlformats.org/presentationml/2006/main">
+  <p:cSld>
+    <p:spTree>
+      <p:nvGrpSpPr>
+        <p:cNvPr id="1" name=""/>
+        <p:cNvGrpSpPr/>
+        <p:nvPr/>
+      </p:nvGrpSpPr>
+      <p:grpSpPr>
+        <a:xfrm>
+          <a:off x="0" y="0"/>
+          <a:ext cx="0" cy="0"/>
+          <a:chOff x="0" y="0"/>
+          <a:chExt cx="0" cy="0"/>
+        </a:xfrm>
+      </p:grpSpPr>
+      <p:pic>
+        <p:nvPicPr>
+          <p:cNvPr id="4" name="Image 3">
+            <a:extLst>
+              <a:ext uri="{FF2B5EF4-FFF2-40B4-BE49-F238E27FC236}">
+                <a16:creationId xmlns:a16="http://schemas.microsoft.com/office/drawing/2014/main" id="{96B54DF2-DEAA-47D8-B69D-9BE28262E8BE}"/>
+              </a:ext>
+            </a:extLst>
+          </p:cNvPr>
+          <p:cNvPicPr>
+            <a:picLocks noChangeAspect="1"/>
+          </p:cNvPicPr>
+          <p:nvPr/>
+        </p:nvPicPr>
+        <p:blipFill>
+          <a:blip r:embed="rId2"/>
+          <a:stretch>
+            <a:fillRect/>
+          </a:stretch>
+        </p:blipFill>
+        <p:spPr>
+          <a:xfrm>
+            <a:off x="602506" y="0"/>
+            <a:ext cx="5148249" cy="6858000"/>
+          </a:xfrm>
+          <a:prstGeom prst="rect">
+            <a:avLst/>
+          </a:prstGeom>
+        </p:spPr>
+      </p:pic>
+      <p:pic>
+        <p:nvPicPr>
+          <p:cNvPr id="5" name="Image 4">
+            <a:extLst>
+              <a:ext uri="{FF2B5EF4-FFF2-40B4-BE49-F238E27FC236}">
+                <a16:creationId xmlns:a16="http://schemas.microsoft.com/office/drawing/2014/main" id="{FED7D196-6067-4E1B-8A70-F985604B24BB}"/>
+              </a:ext>
+            </a:extLst>
+          </p:cNvPr>
+          <p:cNvPicPr>
+            <a:picLocks noChangeAspect="1"/>
+          </p:cNvPicPr>
+          <p:nvPr/>
+        </p:nvPicPr>
+        <p:blipFill>
+          <a:blip r:embed="rId3"/>
+          <a:stretch>
+            <a:fillRect/>
+          </a:stretch>
+        </p:blipFill>
+        <p:spPr>
+          <a:xfrm>
+            <a:off x="6206516" y="0"/>
+            <a:ext cx="5215034" cy="6858000"/>
+          </a:xfrm>
+          <a:prstGeom prst="rect">
+            <a:avLst/>
+          </a:prstGeom>
+        </p:spPr>
+      </p:pic>
+    </p:spTree>
+    <p:extLst>
+      <p:ext uri="{BB962C8B-B14F-4D97-AF65-F5344CB8AC3E}">
+        <p14:creationId xmlns:p14="http://schemas.microsoft.com/office/powerpoint/2010/main" val="1043868686"/>
+      </p:ext>
+    </p:extLst>
+  </p:cSld>
+  <p:clrMapOvr>
+    <a:masterClrMapping/>
+  </p:clrMapOvr>
+  <p:timing>
+    <p:tnLst>
+      <p:par>
+        <p:cTn id="1" dur="indefinite" restart="never" nodeType="tmRoot"/>
+      </p:par>
+    </p:tnLst>
+  </p:timing>
+</p:sld>
+</file>
+
+<file path=ppt/slides/slide23.xml><?xml version="1.0" encoding="utf-8"?>
+<p:sld xmlns:a="http://schemas.openxmlformats.org/drawingml/2006/main" xmlns:r="http://schemas.openxmlformats.org/officeDocument/2006/relationships" xmlns:p="http://schemas.openxmlformats.org/presentationml/2006/main">
+  <p:cSld>
+    <p:spTree>
+      <p:nvGrpSpPr>
+        <p:cNvPr id="1" name=""/>
+        <p:cNvGrpSpPr/>
+        <p:nvPr/>
+      </p:nvGrpSpPr>
+      <p:grpSpPr>
+        <a:xfrm>
+          <a:off x="0" y="0"/>
+          <a:ext cx="0" cy="0"/>
+          <a:chOff x="0" y="0"/>
+          <a:chExt cx="0" cy="0"/>
+        </a:xfrm>
+      </p:grpSpPr>
+      <p:pic>
+        <p:nvPicPr>
           <p:cNvPr id="4" name="Image 3">
             <a:extLst>
               <a:ext uri="{FF2B5EF4-FFF2-40B4-BE49-F238E27FC236}">
@@ -8226,7 +8471,7 @@
 </p:sld>
 </file>
 
-<file path=ppt/slides/slide21.xml><?xml version="1.0" encoding="utf-8"?>
+<file path=ppt/slides/slide24.xml><?xml version="1.0" encoding="utf-8"?>
 <p:sld xmlns:a="http://schemas.openxmlformats.org/drawingml/2006/main" xmlns:r="http://schemas.openxmlformats.org/officeDocument/2006/relationships" xmlns:p="http://schemas.openxmlformats.org/presentationml/2006/main">
   <p:cSld>
     <p:spTree>
@@ -8278,7 +8523,7 @@
 </p:sld>
 </file>
 
-<file path=ppt/slides/slide22.xml><?xml version="1.0" encoding="utf-8"?>
+<file path=ppt/slides/slide25.xml><?xml version="1.0" encoding="utf-8"?>
 <p:sld xmlns:a="http://schemas.openxmlformats.org/drawingml/2006/main" xmlns:r="http://schemas.openxmlformats.org/officeDocument/2006/relationships" xmlns:p="http://schemas.openxmlformats.org/presentationml/2006/main">
   <p:cSld>
     <p:spTree>
@@ -8344,22 +8589,28 @@
       </p:sp>
       <p:pic>
         <p:nvPicPr>
-          <p:cNvPr id="4" name="Image 3"/>
+          <p:cNvPr id="3" name="Image 2"/>
           <p:cNvPicPr>
             <a:picLocks noChangeAspect="1"/>
           </p:cNvPicPr>
           <p:nvPr/>
         </p:nvPicPr>
         <p:blipFill>
-          <a:blip r:embed="rId2"/>
+          <a:blip r:embed="rId2">
+            <a:extLst>
+              <a:ext uri="{28A0092B-C50C-407E-A947-70E740481C1C}">
+                <a14:useLocalDpi xmlns:a14="http://schemas.microsoft.com/office/drawing/2010/main" val="0"/>
+              </a:ext>
+            </a:extLst>
+          </a:blip>
           <a:stretch>
             <a:fillRect/>
           </a:stretch>
         </p:blipFill>
         <p:spPr>
           <a:xfrm>
-            <a:off x="62618" y="1513490"/>
-            <a:ext cx="11815386" cy="4052771"/>
+            <a:off x="0" y="1642884"/>
+            <a:ext cx="12192000" cy="3572231"/>
           </a:xfrm>
           <a:prstGeom prst="rect">
             <a:avLst/>
@@ -8596,6 +8847,308 @@
       </p:grpSpPr>
       <p:sp>
         <p:nvSpPr>
+          <p:cNvPr id="5" name="Rectangle 4"/>
+          <p:cNvSpPr/>
+          <p:nvPr/>
+        </p:nvSpPr>
+        <p:spPr>
+          <a:xfrm>
+            <a:off x="101884" y="268377"/>
+            <a:ext cx="2910733" cy="369332"/>
+          </a:xfrm>
+          <a:prstGeom prst="rect">
+            <a:avLst/>
+          </a:prstGeom>
+        </p:spPr>
+        <p:txBody>
+          <a:bodyPr wrap="none">
+            <a:spAutoFit/>
+          </a:bodyPr>
+          <a:lstStyle/>
+          <a:p>
+            <a:r>
+              <a:rPr lang="fr-FR" dirty="0">
+                <a:solidFill>
+                  <a:srgbClr val="FF0000"/>
+                </a:solidFill>
+              </a:rPr>
+              <a:t>III. Diagramme de séquence</a:t>
+            </a:r>
+          </a:p>
+        </p:txBody>
+      </p:sp>
+      <p:sp>
+        <p:nvSpPr>
+          <p:cNvPr id="6" name="ZoneTexte 5"/>
+          <p:cNvSpPr txBox="1"/>
+          <p:nvPr/>
+        </p:nvSpPr>
+        <p:spPr>
+          <a:xfrm>
+            <a:off x="4364182" y="268377"/>
+            <a:ext cx="1346662" cy="369332"/>
+          </a:xfrm>
+          <a:prstGeom prst="rect">
+            <a:avLst/>
+          </a:prstGeom>
+          <a:noFill/>
+        </p:spPr>
+        <p:txBody>
+          <a:bodyPr wrap="square" rtlCol="0">
+            <a:spAutoFit/>
+          </a:bodyPr>
+          <a:lstStyle/>
+          <a:p>
+            <a:r>
+              <a:rPr lang="fr-FR" dirty="0" smtClean="0"/>
+              <a:t>Etudiant 1</a:t>
+            </a:r>
+            <a:endParaRPr lang="fr-FR" dirty="0"/>
+          </a:p>
+        </p:txBody>
+      </p:sp>
+      <p:pic>
+        <p:nvPicPr>
+          <p:cNvPr id="7" name="Image 6"/>
+          <p:cNvPicPr>
+            <a:picLocks noChangeAspect="1"/>
+          </p:cNvPicPr>
+          <p:nvPr/>
+        </p:nvPicPr>
+        <p:blipFill>
+          <a:blip r:embed="rId2">
+            <a:extLst>
+              <a:ext uri="{28A0092B-C50C-407E-A947-70E740481C1C}">
+                <a14:useLocalDpi xmlns:a14="http://schemas.microsoft.com/office/drawing/2010/main" val="0"/>
+              </a:ext>
+            </a:extLst>
+          </a:blip>
+          <a:stretch>
+            <a:fillRect/>
+          </a:stretch>
+        </p:blipFill>
+        <p:spPr>
+          <a:xfrm>
+            <a:off x="1504605" y="921513"/>
+            <a:ext cx="7728350" cy="5622654"/>
+          </a:xfrm>
+          <a:prstGeom prst="rect">
+            <a:avLst/>
+          </a:prstGeom>
+        </p:spPr>
+      </p:pic>
+    </p:spTree>
+    <p:extLst>
+      <p:ext uri="{BB962C8B-B14F-4D97-AF65-F5344CB8AC3E}">
+        <p14:creationId xmlns:p14="http://schemas.microsoft.com/office/powerpoint/2010/main" val="2336041332"/>
+      </p:ext>
+    </p:extLst>
+  </p:cSld>
+  <p:clrMapOvr>
+    <a:masterClrMapping/>
+  </p:clrMapOvr>
+</p:sld>
+</file>
+
+<file path=ppt/slides/slide6.xml><?xml version="1.0" encoding="utf-8"?>
+<p:sld xmlns:a="http://schemas.openxmlformats.org/drawingml/2006/main" xmlns:r="http://schemas.openxmlformats.org/officeDocument/2006/relationships" xmlns:p="http://schemas.openxmlformats.org/presentationml/2006/main">
+  <p:cSld>
+    <p:spTree>
+      <p:nvGrpSpPr>
+        <p:cNvPr id="1" name=""/>
+        <p:cNvGrpSpPr/>
+        <p:nvPr/>
+      </p:nvGrpSpPr>
+      <p:grpSpPr>
+        <a:xfrm>
+          <a:off x="0" y="0"/>
+          <a:ext cx="0" cy="0"/>
+          <a:chOff x="0" y="0"/>
+          <a:chExt cx="0" cy="0"/>
+        </a:xfrm>
+      </p:grpSpPr>
+      <p:pic>
+        <p:nvPicPr>
+          <p:cNvPr id="2" name="Image 1"/>
+          <p:cNvPicPr>
+            <a:picLocks noChangeAspect="1"/>
+          </p:cNvPicPr>
+          <p:nvPr/>
+        </p:nvPicPr>
+        <p:blipFill>
+          <a:blip r:embed="rId2">
+            <a:extLst>
+              <a:ext uri="{28A0092B-C50C-407E-A947-70E740481C1C}">
+                <a14:useLocalDpi xmlns:a14="http://schemas.microsoft.com/office/drawing/2010/main" val="0"/>
+              </a:ext>
+            </a:extLst>
+          </a:blip>
+          <a:stretch>
+            <a:fillRect/>
+          </a:stretch>
+        </p:blipFill>
+        <p:spPr>
+          <a:xfrm>
+            <a:off x="2358741" y="979857"/>
+            <a:ext cx="5357544" cy="5640263"/>
+          </a:xfrm>
+          <a:prstGeom prst="rect">
+            <a:avLst/>
+          </a:prstGeom>
+        </p:spPr>
+      </p:pic>
+      <p:sp>
+        <p:nvSpPr>
+          <p:cNvPr id="5" name="ZoneTexte 4"/>
+          <p:cNvSpPr txBox="1"/>
+          <p:nvPr/>
+        </p:nvSpPr>
+        <p:spPr>
+          <a:xfrm>
+            <a:off x="4364182" y="268377"/>
+            <a:ext cx="1346662" cy="369332"/>
+          </a:xfrm>
+          <a:prstGeom prst="rect">
+            <a:avLst/>
+          </a:prstGeom>
+          <a:noFill/>
+        </p:spPr>
+        <p:txBody>
+          <a:bodyPr wrap="square" rtlCol="0">
+            <a:spAutoFit/>
+          </a:bodyPr>
+          <a:lstStyle/>
+          <a:p>
+            <a:r>
+              <a:rPr lang="fr-FR" dirty="0" smtClean="0"/>
+              <a:t>Etudiant 1</a:t>
+            </a:r>
+            <a:endParaRPr lang="fr-FR" dirty="0"/>
+          </a:p>
+        </p:txBody>
+      </p:sp>
+    </p:spTree>
+    <p:extLst>
+      <p:ext uri="{BB962C8B-B14F-4D97-AF65-F5344CB8AC3E}">
+        <p14:creationId xmlns:p14="http://schemas.microsoft.com/office/powerpoint/2010/main" val="1389442084"/>
+      </p:ext>
+    </p:extLst>
+  </p:cSld>
+  <p:clrMapOvr>
+    <a:masterClrMapping/>
+  </p:clrMapOvr>
+</p:sld>
+</file>
+
+<file path=ppt/slides/slide7.xml><?xml version="1.0" encoding="utf-8"?>
+<p:sld xmlns:a="http://schemas.openxmlformats.org/drawingml/2006/main" xmlns:r="http://schemas.openxmlformats.org/officeDocument/2006/relationships" xmlns:p="http://schemas.openxmlformats.org/presentationml/2006/main">
+  <p:cSld>
+    <p:spTree>
+      <p:nvGrpSpPr>
+        <p:cNvPr id="1" name=""/>
+        <p:cNvGrpSpPr/>
+        <p:nvPr/>
+      </p:nvGrpSpPr>
+      <p:grpSpPr>
+        <a:xfrm>
+          <a:off x="0" y="0"/>
+          <a:ext cx="0" cy="0"/>
+          <a:chOff x="0" y="0"/>
+          <a:chExt cx="0" cy="0"/>
+        </a:xfrm>
+      </p:grpSpPr>
+      <p:sp>
+        <p:nvSpPr>
+          <p:cNvPr id="3" name="ZoneTexte 2"/>
+          <p:cNvSpPr txBox="1"/>
+          <p:nvPr/>
+        </p:nvSpPr>
+        <p:spPr>
+          <a:xfrm>
+            <a:off x="4364182" y="268377"/>
+            <a:ext cx="1346662" cy="369332"/>
+          </a:xfrm>
+          <a:prstGeom prst="rect">
+            <a:avLst/>
+          </a:prstGeom>
+          <a:noFill/>
+        </p:spPr>
+        <p:txBody>
+          <a:bodyPr wrap="square" rtlCol="0">
+            <a:spAutoFit/>
+          </a:bodyPr>
+          <a:lstStyle/>
+          <a:p>
+            <a:r>
+              <a:rPr lang="fr-FR" dirty="0" smtClean="0"/>
+              <a:t>Etudiant 1</a:t>
+            </a:r>
+            <a:endParaRPr lang="fr-FR" dirty="0"/>
+          </a:p>
+        </p:txBody>
+      </p:sp>
+      <p:pic>
+        <p:nvPicPr>
+          <p:cNvPr id="4" name="Image 3"/>
+          <p:cNvPicPr>
+            <a:picLocks noChangeAspect="1"/>
+          </p:cNvPicPr>
+          <p:nvPr/>
+        </p:nvPicPr>
+        <p:blipFill>
+          <a:blip r:embed="rId2">
+            <a:extLst>
+              <a:ext uri="{28A0092B-C50C-407E-A947-70E740481C1C}">
+                <a14:useLocalDpi xmlns:a14="http://schemas.microsoft.com/office/drawing/2010/main" val="0"/>
+              </a:ext>
+            </a:extLst>
+          </a:blip>
+          <a:stretch>
+            <a:fillRect/>
+          </a:stretch>
+        </p:blipFill>
+        <p:spPr>
+          <a:xfrm>
+            <a:off x="2094809" y="786839"/>
+            <a:ext cx="7679870" cy="5863244"/>
+          </a:xfrm>
+          <a:prstGeom prst="rect">
+            <a:avLst/>
+          </a:prstGeom>
+        </p:spPr>
+      </p:pic>
+    </p:spTree>
+    <p:extLst>
+      <p:ext uri="{BB962C8B-B14F-4D97-AF65-F5344CB8AC3E}">
+        <p14:creationId xmlns:p14="http://schemas.microsoft.com/office/powerpoint/2010/main" val="3605433700"/>
+      </p:ext>
+    </p:extLst>
+  </p:cSld>
+  <p:clrMapOvr>
+    <a:masterClrMapping/>
+  </p:clrMapOvr>
+</p:sld>
+</file>
+
+<file path=ppt/slides/slide8.xml><?xml version="1.0" encoding="utf-8"?>
+<p:sld xmlns:a="http://schemas.openxmlformats.org/drawingml/2006/main" xmlns:r="http://schemas.openxmlformats.org/officeDocument/2006/relationships" xmlns:p="http://schemas.openxmlformats.org/presentationml/2006/main">
+  <p:cSld>
+    <p:spTree>
+      <p:nvGrpSpPr>
+        <p:cNvPr id="1" name=""/>
+        <p:cNvGrpSpPr/>
+        <p:nvPr/>
+      </p:nvGrpSpPr>
+      <p:grpSpPr>
+        <a:xfrm>
+          <a:off x="0" y="0"/>
+          <a:ext cx="0" cy="0"/>
+          <a:chOff x="0" y="0"/>
+          <a:chExt cx="0" cy="0"/>
+        </a:xfrm>
+      </p:grpSpPr>
+      <p:sp>
+        <p:nvSpPr>
           <p:cNvPr id="2" name="Titre 1"/>
           <p:cNvSpPr>
             <a:spLocks noGrp="1"/>
@@ -8672,7 +9225,7 @@
 </p:sld>
 </file>
 
-<file path=ppt/slides/slide6.xml><?xml version="1.0" encoding="utf-8"?>
+<file path=ppt/slides/slide9.xml><?xml version="1.0" encoding="utf-8"?>
 <p:sld xmlns:a="http://schemas.openxmlformats.org/drawingml/2006/main" xmlns:r="http://schemas.openxmlformats.org/officeDocument/2006/relationships" xmlns:p="http://schemas.openxmlformats.org/presentationml/2006/main">
   <p:cSld>
     <p:spTree>
@@ -8723,280 +9276,6 @@
     <p:extLst>
       <p:ext uri="{BB962C8B-B14F-4D97-AF65-F5344CB8AC3E}">
         <p14:creationId xmlns:p14="http://schemas.microsoft.com/office/powerpoint/2010/main" val="649762590"/>
-      </p:ext>
-    </p:extLst>
-  </p:cSld>
-  <p:clrMapOvr>
-    <a:masterClrMapping/>
-  </p:clrMapOvr>
-  <p:timing>
-    <p:tnLst>
-      <p:par>
-        <p:cTn id="1" dur="indefinite" restart="never" nodeType="tmRoot"/>
-      </p:par>
-    </p:tnLst>
-  </p:timing>
-</p:sld>
-</file>
-
-<file path=ppt/slides/slide7.xml><?xml version="1.0" encoding="utf-8"?>
-<p:sld xmlns:a="http://schemas.openxmlformats.org/drawingml/2006/main" xmlns:r="http://schemas.openxmlformats.org/officeDocument/2006/relationships" xmlns:p="http://schemas.openxmlformats.org/presentationml/2006/main">
-  <p:cSld>
-    <p:spTree>
-      <p:nvGrpSpPr>
-        <p:cNvPr id="1" name=""/>
-        <p:cNvGrpSpPr/>
-        <p:nvPr/>
-      </p:nvGrpSpPr>
-      <p:grpSpPr>
-        <a:xfrm>
-          <a:off x="0" y="0"/>
-          <a:ext cx="0" cy="0"/>
-          <a:chOff x="0" y="0"/>
-          <a:chExt cx="0" cy="0"/>
-        </a:xfrm>
-      </p:grpSpPr>
-      <p:pic>
-        <p:nvPicPr>
-          <p:cNvPr id="4" name="Image 3"/>
-          <p:cNvPicPr>
-            <a:picLocks noChangeAspect="1"/>
-          </p:cNvPicPr>
-          <p:nvPr/>
-        </p:nvPicPr>
-        <p:blipFill>
-          <a:blip r:embed="rId2">
-            <a:extLst>
-              <a:ext uri="{28A0092B-C50C-407E-A947-70E740481C1C}">
-                <a14:useLocalDpi xmlns:a14="http://schemas.microsoft.com/office/drawing/2010/main" val="0"/>
-              </a:ext>
-            </a:extLst>
-          </a:blip>
-          <a:stretch>
-            <a:fillRect/>
-          </a:stretch>
-        </p:blipFill>
-        <p:spPr>
-          <a:xfrm>
-            <a:off x="2546131" y="344820"/>
-            <a:ext cx="6272253" cy="6012321"/>
-          </a:xfrm>
-          <a:prstGeom prst="rect">
-            <a:avLst/>
-          </a:prstGeom>
-        </p:spPr>
-      </p:pic>
-    </p:spTree>
-    <p:extLst>
-      <p:ext uri="{BB962C8B-B14F-4D97-AF65-F5344CB8AC3E}">
-        <p14:creationId xmlns:p14="http://schemas.microsoft.com/office/powerpoint/2010/main" val="3602473879"/>
-      </p:ext>
-    </p:extLst>
-  </p:cSld>
-  <p:clrMapOvr>
-    <a:masterClrMapping/>
-  </p:clrMapOvr>
-  <p:timing>
-    <p:tnLst>
-      <p:par>
-        <p:cTn id="1" dur="indefinite" restart="never" nodeType="tmRoot"/>
-      </p:par>
-    </p:tnLst>
-  </p:timing>
-</p:sld>
-</file>
-
-<file path=ppt/slides/slide8.xml><?xml version="1.0" encoding="utf-8"?>
-<p:sld xmlns:a="http://schemas.openxmlformats.org/drawingml/2006/main" xmlns:r="http://schemas.openxmlformats.org/officeDocument/2006/relationships" xmlns:p="http://schemas.openxmlformats.org/presentationml/2006/main">
-  <p:cSld>
-    <p:spTree>
-      <p:nvGrpSpPr>
-        <p:cNvPr id="1" name=""/>
-        <p:cNvGrpSpPr/>
-        <p:nvPr/>
-      </p:nvGrpSpPr>
-      <p:grpSpPr>
-        <a:xfrm>
-          <a:off x="0" y="0"/>
-          <a:ext cx="0" cy="0"/>
-          <a:chOff x="0" y="0"/>
-          <a:chExt cx="0" cy="0"/>
-        </a:xfrm>
-      </p:grpSpPr>
-      <p:pic>
-        <p:nvPicPr>
-          <p:cNvPr id="4" name="Image 3"/>
-          <p:cNvPicPr>
-            <a:picLocks noChangeAspect="1"/>
-          </p:cNvPicPr>
-          <p:nvPr/>
-        </p:nvPicPr>
-        <p:blipFill>
-          <a:blip r:embed="rId2">
-            <a:extLst>
-              <a:ext uri="{28A0092B-C50C-407E-A947-70E740481C1C}">
-                <a14:useLocalDpi xmlns:a14="http://schemas.microsoft.com/office/drawing/2010/main" val="0"/>
-              </a:ext>
-            </a:extLst>
-          </a:blip>
-          <a:stretch>
-            <a:fillRect/>
-          </a:stretch>
-        </p:blipFill>
-        <p:spPr>
-          <a:xfrm>
-            <a:off x="2293882" y="737901"/>
-            <a:ext cx="6808448" cy="5422443"/>
-          </a:xfrm>
-          <a:prstGeom prst="rect">
-            <a:avLst/>
-          </a:prstGeom>
-        </p:spPr>
-      </p:pic>
-    </p:spTree>
-    <p:extLst>
-      <p:ext uri="{BB962C8B-B14F-4D97-AF65-F5344CB8AC3E}">
-        <p14:creationId xmlns:p14="http://schemas.microsoft.com/office/powerpoint/2010/main" val="2943724827"/>
-      </p:ext>
-    </p:extLst>
-  </p:cSld>
-  <p:clrMapOvr>
-    <a:masterClrMapping/>
-  </p:clrMapOvr>
-  <p:timing>
-    <p:tnLst>
-      <p:par>
-        <p:cTn id="1" dur="indefinite" restart="never" nodeType="tmRoot"/>
-      </p:par>
-    </p:tnLst>
-  </p:timing>
-</p:sld>
-</file>
-
-<file path=ppt/slides/slide9.xml><?xml version="1.0" encoding="utf-8"?>
-<p:sld xmlns:a="http://schemas.openxmlformats.org/drawingml/2006/main" xmlns:r="http://schemas.openxmlformats.org/officeDocument/2006/relationships" xmlns:p="http://schemas.openxmlformats.org/presentationml/2006/main">
-  <p:cSld>
-    <p:spTree>
-      <p:nvGrpSpPr>
-        <p:cNvPr id="1" name=""/>
-        <p:cNvGrpSpPr/>
-        <p:nvPr/>
-      </p:nvGrpSpPr>
-      <p:grpSpPr>
-        <a:xfrm>
-          <a:off x="0" y="0"/>
-          <a:ext cx="0" cy="0"/>
-          <a:chOff x="0" y="0"/>
-          <a:chExt cx="0" cy="0"/>
-        </a:xfrm>
-      </p:grpSpPr>
-      <p:sp>
-        <p:nvSpPr>
-          <p:cNvPr id="2" name="Rectangle 1"/>
-          <p:cNvSpPr/>
-          <p:nvPr/>
-        </p:nvSpPr>
-        <p:spPr>
-          <a:xfrm>
-            <a:off x="101884" y="268377"/>
-            <a:ext cx="2910733" cy="369332"/>
-          </a:xfrm>
-          <a:prstGeom prst="rect">
-            <a:avLst/>
-          </a:prstGeom>
-        </p:spPr>
-        <p:txBody>
-          <a:bodyPr wrap="none">
-            <a:spAutoFit/>
-          </a:bodyPr>
-          <a:lstStyle/>
-          <a:p>
-            <a:r>
-              <a:rPr lang="fr-FR" dirty="0">
-                <a:solidFill>
-                  <a:srgbClr val="FF0000"/>
-                </a:solidFill>
-              </a:rPr>
-              <a:t>III. Diagramme de séquence</a:t>
-            </a:r>
-          </a:p>
-        </p:txBody>
-      </p:sp>
-      <p:sp>
-        <p:nvSpPr>
-          <p:cNvPr id="3" name="ZoneTexte 2">
-            <a:extLst>
-              <a:ext uri="{FF2B5EF4-FFF2-40B4-BE49-F238E27FC236}">
-                <a16:creationId xmlns:a16="http://schemas.microsoft.com/office/drawing/2014/main" id="{8185D6C2-D95C-4E45-A146-B74583E5BE84}"/>
-              </a:ext>
-            </a:extLst>
-          </p:cNvPr>
-          <p:cNvSpPr txBox="1"/>
-          <p:nvPr/>
-        </p:nvSpPr>
-        <p:spPr>
-          <a:xfrm>
-            <a:off x="5378741" y="83711"/>
-            <a:ext cx="1434517" cy="369332"/>
-          </a:xfrm>
-          <a:prstGeom prst="rect">
-            <a:avLst/>
-          </a:prstGeom>
-          <a:noFill/>
-        </p:spPr>
-        <p:txBody>
-          <a:bodyPr wrap="square" rtlCol="0">
-            <a:spAutoFit/>
-          </a:bodyPr>
-          <a:lstStyle/>
-          <a:p>
-            <a:r>
-              <a:rPr lang="fr-FR" dirty="0"/>
-              <a:t>Etudiant 3</a:t>
-            </a:r>
-          </a:p>
-        </p:txBody>
-      </p:sp>
-      <p:pic>
-        <p:nvPicPr>
-          <p:cNvPr id="5" name="Image 4">
-            <a:extLst>
-              <a:ext uri="{FF2B5EF4-FFF2-40B4-BE49-F238E27FC236}">
-                <a16:creationId xmlns:a16="http://schemas.microsoft.com/office/drawing/2014/main" id="{911A8E25-D6B9-4FE1-8F10-03F1E9AF6824}"/>
-              </a:ext>
-            </a:extLst>
-          </p:cNvPr>
-          <p:cNvPicPr>
-            <a:picLocks noChangeAspect="1"/>
-          </p:cNvPicPr>
-          <p:nvPr/>
-        </p:nvPicPr>
-        <p:blipFill>
-          <a:blip r:embed="rId2">
-            <a:extLst>
-              <a:ext uri="{28A0092B-C50C-407E-A947-70E740481C1C}">
-                <a14:useLocalDpi xmlns:a14="http://schemas.microsoft.com/office/drawing/2010/main" val="0"/>
-              </a:ext>
-            </a:extLst>
-          </a:blip>
-          <a:stretch>
-            <a:fillRect/>
-          </a:stretch>
-        </p:blipFill>
-        <p:spPr>
-          <a:xfrm>
-            <a:off x="153314" y="637708"/>
-            <a:ext cx="11759053" cy="5755071"/>
-          </a:xfrm>
-          <a:prstGeom prst="rect">
-            <a:avLst/>
-          </a:prstGeom>
-        </p:spPr>
-      </p:pic>
-    </p:spTree>
-    <p:extLst>
-      <p:ext uri="{BB962C8B-B14F-4D97-AF65-F5344CB8AC3E}">
-        <p14:creationId xmlns:p14="http://schemas.microsoft.com/office/powerpoint/2010/main" val="3295572073"/>
       </p:ext>
     </p:extLst>
   </p:cSld>

</xml_diff>